<commit_message>
fox wanders after eat rabbit
</commit_message>
<xml_diff>
--- a/Assessment/SofiWesson TDD.pptx
+++ b/Assessment/SofiWesson TDD.pptx
@@ -10,21 +10,18 @@
     <p:sldId id="258" r:id="rId4"/>
     <p:sldId id="259" r:id="rId5"/>
     <p:sldId id="260" r:id="rId6"/>
-    <p:sldId id="261" r:id="rId7"/>
-    <p:sldId id="262" r:id="rId8"/>
-    <p:sldId id="264" r:id="rId9"/>
-    <p:sldId id="265" r:id="rId10"/>
-    <p:sldId id="266" r:id="rId11"/>
-    <p:sldId id="268" r:id="rId12"/>
+    <p:sldId id="277" r:id="rId7"/>
+    <p:sldId id="278" r:id="rId8"/>
+    <p:sldId id="279" r:id="rId9"/>
+    <p:sldId id="262" r:id="rId10"/>
+    <p:sldId id="264" r:id="rId11"/>
+    <p:sldId id="266" r:id="rId12"/>
     <p:sldId id="267" r:id="rId13"/>
     <p:sldId id="269" r:id="rId14"/>
-    <p:sldId id="270" r:id="rId15"/>
-    <p:sldId id="271" r:id="rId16"/>
-    <p:sldId id="272" r:id="rId17"/>
-    <p:sldId id="273" r:id="rId18"/>
-    <p:sldId id="274" r:id="rId19"/>
-    <p:sldId id="275" r:id="rId20"/>
-    <p:sldId id="276" r:id="rId21"/>
+    <p:sldId id="271" r:id="rId15"/>
+    <p:sldId id="273" r:id="rId16"/>
+    <p:sldId id="275" r:id="rId17"/>
+    <p:sldId id="276" r:id="rId18"/>
   </p:sldIdLst>
   <p:sldSz cx="12192000" cy="6858000"/>
   <p:notesSz cx="6858000" cy="9144000"/>
@@ -283,7 +280,7 @@
           <a:p>
             <a:fld id="{81B8F32D-D8B6-4B9E-9CBF-DCAC30B7B93D}" type="datetimeFigureOut">
               <a:rPr lang="en-US" smtClean="0"/>
-              <a:t>7/27/2021</a:t>
+              <a:t>12/10/2021</a:t>
             </a:fld>
             <a:endParaRPr lang="en-US"/>
           </a:p>
@@ -599,7 +596,7 @@
           <a:p>
             <a:fld id="{81B8F32D-D8B6-4B9E-9CBF-DCAC30B7B93D}" type="datetimeFigureOut">
               <a:rPr lang="en-US" smtClean="0"/>
-              <a:t>7/27/2021</a:t>
+              <a:t>12/10/2021</a:t>
             </a:fld>
             <a:endParaRPr lang="en-US"/>
           </a:p>
@@ -904,7 +901,7 @@
           <a:p>
             <a:fld id="{81B8F32D-D8B6-4B9E-9CBF-DCAC30B7B93D}" type="datetimeFigureOut">
               <a:rPr lang="en-US" smtClean="0"/>
-              <a:t>7/27/2021</a:t>
+              <a:t>12/10/2021</a:t>
             </a:fld>
             <a:endParaRPr lang="en-US"/>
           </a:p>
@@ -1111,7 +1108,7 @@
           <a:p>
             <a:fld id="{81B8F32D-D8B6-4B9E-9CBF-DCAC30B7B93D}" type="datetimeFigureOut">
               <a:rPr lang="en-US" smtClean="0"/>
-              <a:t>7/27/2021</a:t>
+              <a:t>12/10/2021</a:t>
             </a:fld>
             <a:endParaRPr lang="en-US"/>
           </a:p>
@@ -1459,7 +1456,7 @@
           <a:p>
             <a:fld id="{81B8F32D-D8B6-4B9E-9CBF-DCAC30B7B93D}" type="datetimeFigureOut">
               <a:rPr lang="en-US" smtClean="0"/>
-              <a:t>7/27/2021</a:t>
+              <a:t>12/10/2021</a:t>
             </a:fld>
             <a:endParaRPr lang="en-US"/>
           </a:p>
@@ -1930,7 +1927,7 @@
           <a:p>
             <a:fld id="{81B8F32D-D8B6-4B9E-9CBF-DCAC30B7B93D}" type="datetimeFigureOut">
               <a:rPr lang="en-US" smtClean="0"/>
-              <a:t>7/27/2021</a:t>
+              <a:t>12/10/2021</a:t>
             </a:fld>
             <a:endParaRPr lang="en-US"/>
           </a:p>
@@ -2465,7 +2462,7 @@
           <a:p>
             <a:fld id="{81B8F32D-D8B6-4B9E-9CBF-DCAC30B7B93D}" type="datetimeFigureOut">
               <a:rPr lang="en-US" smtClean="0"/>
-              <a:t>7/27/2021</a:t>
+              <a:t>12/10/2021</a:t>
             </a:fld>
             <a:endParaRPr lang="en-US"/>
           </a:p>
@@ -2682,7 +2679,7 @@
           <a:p>
             <a:fld id="{81B8F32D-D8B6-4B9E-9CBF-DCAC30B7B93D}" type="datetimeFigureOut">
               <a:rPr lang="en-US" smtClean="0"/>
-              <a:t>7/27/2021</a:t>
+              <a:t>12/10/2021</a:t>
             </a:fld>
             <a:endParaRPr lang="en-US"/>
           </a:p>
@@ -2887,7 +2884,7 @@
           <a:p>
             <a:fld id="{81B8F32D-D8B6-4B9E-9CBF-DCAC30B7B93D}" type="datetimeFigureOut">
               <a:rPr lang="en-US" smtClean="0"/>
-              <a:t>7/27/2021</a:t>
+              <a:t>12/10/2021</a:t>
             </a:fld>
             <a:endParaRPr lang="en-US"/>
           </a:p>
@@ -3217,7 +3214,7 @@
           <a:p>
             <a:fld id="{81B8F32D-D8B6-4B9E-9CBF-DCAC30B7B93D}" type="datetimeFigureOut">
               <a:rPr lang="en-US" smtClean="0"/>
-              <a:t>7/27/2021</a:t>
+              <a:t>12/10/2021</a:t>
             </a:fld>
             <a:endParaRPr lang="en-US"/>
           </a:p>
@@ -3527,7 +3524,7 @@
           <a:p>
             <a:fld id="{81B8F32D-D8B6-4B9E-9CBF-DCAC30B7B93D}" type="datetimeFigureOut">
               <a:rPr lang="en-US" smtClean="0"/>
-              <a:t>7/27/2021</a:t>
+              <a:t>12/10/2021</a:t>
             </a:fld>
             <a:endParaRPr lang="en-US"/>
           </a:p>
@@ -3768,7 +3765,7 @@
             <a:fld id="{81B8F32D-D8B6-4B9E-9CBF-DCAC30B7B93D}" type="datetimeFigureOut">
               <a:rPr lang="en-US" smtClean="0"/>
               <a:pPr/>
-              <a:t>7/27/2021</a:t>
+              <a:t>12/10/2021</a:t>
             </a:fld>
             <a:endParaRPr lang="en-US" dirty="0"/>
           </a:p>
@@ -4297,7 +4294,7 @@
           <a:p>
             <a:r>
               <a:rPr lang="en-AU" dirty="0"/>
-              <a:t>Jordan Wesson</a:t>
+              <a:t>Sofi Wesson</a:t>
             </a:r>
           </a:p>
         </p:txBody>
@@ -4388,7 +4385,7 @@
           <a:p>
             <a:r>
               <a:rPr lang="en-AU" dirty="0"/>
-              <a:t>Main Menu</a:t>
+              <a:t>Game States</a:t>
             </a:r>
           </a:p>
         </p:txBody>
@@ -4421,31 +4418,635 @@
           <a:p>
             <a:r>
               <a:rPr lang="en-AU" dirty="0"/>
-              <a:t>The first screen seen when opening the game.</a:t>
+              <a:t>Menu</a:t>
             </a:r>
           </a:p>
           <a:p>
             <a:r>
               <a:rPr lang="en-AU" dirty="0"/>
-              <a:t>Options can be selected by hovering over it with the curser, using WASD keys, or arrow keys.</a:t>
+              <a:t>Play</a:t>
             </a:r>
           </a:p>
           <a:p>
             <a:r>
               <a:rPr lang="en-AU" dirty="0"/>
-              <a:t>Left click or Enter to Activate highlighted option.</a:t>
+              <a:t>Pause</a:t>
             </a:r>
           </a:p>
           <a:p>
             <a:r>
               <a:rPr lang="en-AU" dirty="0"/>
-              <a:t>Is accessed from:</a:t>
+              <a:t>Game Over</a:t>
             </a:r>
           </a:p>
           <a:p>
             <a:r>
               <a:rPr lang="en-AU" dirty="0"/>
-              <a:t>Game start up, Credits, Pause, Game Over</a:t>
+              <a:t>Credits</a:t>
+            </a:r>
+          </a:p>
+          <a:p>
+            <a:endParaRPr lang="en-AU" dirty="0"/>
+          </a:p>
+        </p:txBody>
+      </p:sp>
+      <p:sp>
+        <p:nvSpPr>
+          <p:cNvPr id="4" name="Rectangle: Rounded Corners 3">
+            <a:extLst>
+              <a:ext uri="{FF2B5EF4-FFF2-40B4-BE49-F238E27FC236}">
+                <a16:creationId xmlns:a16="http://schemas.microsoft.com/office/drawing/2014/main" id="{3171AB5F-13A3-475F-9230-38FC73AD6C45}"/>
+              </a:ext>
+            </a:extLst>
+          </p:cNvPr>
+          <p:cNvSpPr/>
+          <p:nvPr/>
+        </p:nvSpPr>
+        <p:spPr>
+          <a:xfrm>
+            <a:off x="6114996" y="2418249"/>
+            <a:ext cx="1924216" cy="942768"/>
+          </a:xfrm>
+          <a:prstGeom prst="roundRect">
+            <a:avLst/>
+          </a:prstGeom>
+          <a:ln/>
+        </p:spPr>
+        <p:style>
+          <a:lnRef idx="2">
+            <a:schemeClr val="dk1"/>
+          </a:lnRef>
+          <a:fillRef idx="1">
+            <a:schemeClr val="lt1"/>
+          </a:fillRef>
+          <a:effectRef idx="0">
+            <a:schemeClr val="dk1"/>
+          </a:effectRef>
+          <a:fontRef idx="minor">
+            <a:schemeClr val="dk1"/>
+          </a:fontRef>
+        </p:style>
+        <p:txBody>
+          <a:bodyPr rtlCol="0" anchor="ctr"/>
+          <a:lstStyle/>
+          <a:p>
+            <a:pPr algn="ctr"/>
+            <a:r>
+              <a:rPr lang="en-US" altLang="ja-JP" dirty="0"/>
+              <a:t>Menu</a:t>
+            </a:r>
+            <a:endParaRPr lang="en-AU" dirty="0"/>
+          </a:p>
+        </p:txBody>
+      </p:sp>
+      <p:sp>
+        <p:nvSpPr>
+          <p:cNvPr id="5" name="Rectangle: Rounded Corners 4">
+            <a:extLst>
+              <a:ext uri="{FF2B5EF4-FFF2-40B4-BE49-F238E27FC236}">
+                <a16:creationId xmlns:a16="http://schemas.microsoft.com/office/drawing/2014/main" id="{2334A423-1B42-4923-9BF1-7BF94B58A594}"/>
+              </a:ext>
+            </a:extLst>
+          </p:cNvPr>
+          <p:cNvSpPr/>
+          <p:nvPr/>
+        </p:nvSpPr>
+        <p:spPr>
+          <a:xfrm>
+            <a:off x="2947286" y="2418249"/>
+            <a:ext cx="1804945" cy="949022"/>
+          </a:xfrm>
+          <a:prstGeom prst="roundRect">
+            <a:avLst/>
+          </a:prstGeom>
+        </p:spPr>
+        <p:style>
+          <a:lnRef idx="2">
+            <a:schemeClr val="dk1"/>
+          </a:lnRef>
+          <a:fillRef idx="1">
+            <a:schemeClr val="lt1"/>
+          </a:fillRef>
+          <a:effectRef idx="0">
+            <a:schemeClr val="dk1"/>
+          </a:effectRef>
+          <a:fontRef idx="minor">
+            <a:schemeClr val="dk1"/>
+          </a:fontRef>
+        </p:style>
+        <p:txBody>
+          <a:bodyPr rtlCol="0" anchor="ctr"/>
+          <a:lstStyle/>
+          <a:p>
+            <a:pPr algn="ctr"/>
+            <a:r>
+              <a:rPr lang="en-AU" dirty="0"/>
+              <a:t>Pause</a:t>
+            </a:r>
+          </a:p>
+        </p:txBody>
+      </p:sp>
+      <p:sp>
+        <p:nvSpPr>
+          <p:cNvPr id="6" name="Rectangle: Rounded Corners 5">
+            <a:extLst>
+              <a:ext uri="{FF2B5EF4-FFF2-40B4-BE49-F238E27FC236}">
+                <a16:creationId xmlns:a16="http://schemas.microsoft.com/office/drawing/2014/main" id="{025B5F3F-5924-4DAE-96C5-941348389B7E}"/>
+              </a:ext>
+            </a:extLst>
+          </p:cNvPr>
+          <p:cNvSpPr/>
+          <p:nvPr/>
+        </p:nvSpPr>
+        <p:spPr>
+          <a:xfrm>
+            <a:off x="8909000" y="2418249"/>
+            <a:ext cx="2080590" cy="1017767"/>
+          </a:xfrm>
+          <a:prstGeom prst="roundRect">
+            <a:avLst/>
+          </a:prstGeom>
+        </p:spPr>
+        <p:style>
+          <a:lnRef idx="2">
+            <a:schemeClr val="dk1"/>
+          </a:lnRef>
+          <a:fillRef idx="1">
+            <a:schemeClr val="lt1"/>
+          </a:fillRef>
+          <a:effectRef idx="0">
+            <a:schemeClr val="dk1"/>
+          </a:effectRef>
+          <a:fontRef idx="minor">
+            <a:schemeClr val="dk1"/>
+          </a:fontRef>
+        </p:style>
+        <p:txBody>
+          <a:bodyPr rtlCol="0" anchor="ctr"/>
+          <a:lstStyle/>
+          <a:p>
+            <a:pPr algn="ctr"/>
+            <a:r>
+              <a:rPr lang="en-AU" dirty="0"/>
+              <a:t>Credits</a:t>
+            </a:r>
+          </a:p>
+        </p:txBody>
+      </p:sp>
+      <p:sp>
+        <p:nvSpPr>
+          <p:cNvPr id="7" name="Rectangle: Rounded Corners 6">
+            <a:extLst>
+              <a:ext uri="{FF2B5EF4-FFF2-40B4-BE49-F238E27FC236}">
+                <a16:creationId xmlns:a16="http://schemas.microsoft.com/office/drawing/2014/main" id="{805457A3-AC54-4BB7-A061-D90B9133153D}"/>
+              </a:ext>
+            </a:extLst>
+          </p:cNvPr>
+          <p:cNvSpPr/>
+          <p:nvPr/>
+        </p:nvSpPr>
+        <p:spPr>
+          <a:xfrm>
+            <a:off x="4816503" y="4357495"/>
+            <a:ext cx="2003729" cy="1017767"/>
+          </a:xfrm>
+          <a:prstGeom prst="roundRect">
+            <a:avLst/>
+          </a:prstGeom>
+        </p:spPr>
+        <p:style>
+          <a:lnRef idx="2">
+            <a:schemeClr val="dk1"/>
+          </a:lnRef>
+          <a:fillRef idx="1">
+            <a:schemeClr val="lt1"/>
+          </a:fillRef>
+          <a:effectRef idx="0">
+            <a:schemeClr val="dk1"/>
+          </a:effectRef>
+          <a:fontRef idx="minor">
+            <a:schemeClr val="dk1"/>
+          </a:fontRef>
+        </p:style>
+        <p:txBody>
+          <a:bodyPr rtlCol="0" anchor="ctr"/>
+          <a:lstStyle/>
+          <a:p>
+            <a:pPr algn="ctr"/>
+            <a:r>
+              <a:rPr lang="en-AU" dirty="0"/>
+              <a:t>Play</a:t>
+            </a:r>
+          </a:p>
+        </p:txBody>
+      </p:sp>
+      <p:sp>
+        <p:nvSpPr>
+          <p:cNvPr id="8" name="Rectangle: Rounded Corners 7">
+            <a:extLst>
+              <a:ext uri="{FF2B5EF4-FFF2-40B4-BE49-F238E27FC236}">
+                <a16:creationId xmlns:a16="http://schemas.microsoft.com/office/drawing/2014/main" id="{01ABD98B-8A36-46AE-8287-B0A4AB96FD37}"/>
+              </a:ext>
+            </a:extLst>
+          </p:cNvPr>
+          <p:cNvSpPr/>
+          <p:nvPr/>
+        </p:nvSpPr>
+        <p:spPr>
+          <a:xfrm>
+            <a:off x="8807733" y="4357494"/>
+            <a:ext cx="2080590" cy="1017767"/>
+          </a:xfrm>
+          <a:prstGeom prst="roundRect">
+            <a:avLst/>
+          </a:prstGeom>
+        </p:spPr>
+        <p:style>
+          <a:lnRef idx="2">
+            <a:schemeClr val="dk1"/>
+          </a:lnRef>
+          <a:fillRef idx="1">
+            <a:schemeClr val="lt1"/>
+          </a:fillRef>
+          <a:effectRef idx="0">
+            <a:schemeClr val="dk1"/>
+          </a:effectRef>
+          <a:fontRef idx="minor">
+            <a:schemeClr val="dk1"/>
+          </a:fontRef>
+        </p:style>
+        <p:txBody>
+          <a:bodyPr rtlCol="0" anchor="ctr"/>
+          <a:lstStyle/>
+          <a:p>
+            <a:pPr algn="ctr"/>
+            <a:r>
+              <a:rPr lang="en-AU" dirty="0"/>
+              <a:t>Game Over</a:t>
+            </a:r>
+          </a:p>
+        </p:txBody>
+      </p:sp>
+      <p:cxnSp>
+        <p:nvCxnSpPr>
+          <p:cNvPr id="12" name="Connector: Elbow 11">
+            <a:extLst>
+              <a:ext uri="{FF2B5EF4-FFF2-40B4-BE49-F238E27FC236}">
+                <a16:creationId xmlns:a16="http://schemas.microsoft.com/office/drawing/2014/main" id="{E7DE61E9-BB15-4F18-BC7E-70A8934CBD4A}"/>
+              </a:ext>
+            </a:extLst>
+          </p:cNvPr>
+          <p:cNvCxnSpPr>
+            <a:cxnSpLocks/>
+            <a:endCxn id="7" idx="0"/>
+          </p:cNvCxnSpPr>
+          <p:nvPr/>
+        </p:nvCxnSpPr>
+        <p:spPr>
+          <a:xfrm rot="5400000">
+            <a:off x="5664890" y="3511369"/>
+            <a:ext cx="999605" cy="692647"/>
+          </a:xfrm>
+          <a:prstGeom prst="bentConnector3">
+            <a:avLst/>
+          </a:prstGeom>
+          <a:ln>
+            <a:tailEnd type="triangle"/>
+          </a:ln>
+        </p:spPr>
+        <p:style>
+          <a:lnRef idx="1">
+            <a:schemeClr val="dk1"/>
+          </a:lnRef>
+          <a:fillRef idx="0">
+            <a:schemeClr val="dk1"/>
+          </a:fillRef>
+          <a:effectRef idx="0">
+            <a:schemeClr val="dk1"/>
+          </a:effectRef>
+          <a:fontRef idx="minor">
+            <a:schemeClr val="tx1"/>
+          </a:fontRef>
+        </p:style>
+      </p:cxnSp>
+      <p:cxnSp>
+        <p:nvCxnSpPr>
+          <p:cNvPr id="15" name="Connector: Elbow 14">
+            <a:extLst>
+              <a:ext uri="{FF2B5EF4-FFF2-40B4-BE49-F238E27FC236}">
+                <a16:creationId xmlns:a16="http://schemas.microsoft.com/office/drawing/2014/main" id="{BF61CA76-713A-4656-B2D0-8361815B7E01}"/>
+              </a:ext>
+            </a:extLst>
+          </p:cNvPr>
+          <p:cNvCxnSpPr>
+            <a:cxnSpLocks/>
+            <a:stCxn id="7" idx="3"/>
+            <a:endCxn id="8" idx="1"/>
+          </p:cNvCxnSpPr>
+          <p:nvPr/>
+        </p:nvCxnSpPr>
+        <p:spPr>
+          <a:xfrm flipV="1">
+            <a:off x="6820232" y="4866378"/>
+            <a:ext cx="1987501" cy="1"/>
+          </a:xfrm>
+          <a:prstGeom prst="bentConnector3">
+            <a:avLst/>
+          </a:prstGeom>
+          <a:ln>
+            <a:tailEnd type="triangle"/>
+          </a:ln>
+        </p:spPr>
+        <p:style>
+          <a:lnRef idx="1">
+            <a:schemeClr val="dk1"/>
+          </a:lnRef>
+          <a:fillRef idx="0">
+            <a:schemeClr val="dk1"/>
+          </a:fillRef>
+          <a:effectRef idx="0">
+            <a:schemeClr val="dk1"/>
+          </a:effectRef>
+          <a:fontRef idx="minor">
+            <a:schemeClr val="tx1"/>
+          </a:fontRef>
+        </p:style>
+      </p:cxnSp>
+      <p:cxnSp>
+        <p:nvCxnSpPr>
+          <p:cNvPr id="17" name="Connector: Elbow 16">
+            <a:extLst>
+              <a:ext uri="{FF2B5EF4-FFF2-40B4-BE49-F238E27FC236}">
+                <a16:creationId xmlns:a16="http://schemas.microsoft.com/office/drawing/2014/main" id="{7D141833-4EFB-4A7A-B52F-6CC6902D46DE}"/>
+              </a:ext>
+            </a:extLst>
+          </p:cNvPr>
+          <p:cNvCxnSpPr>
+            <a:cxnSpLocks/>
+            <a:stCxn id="7" idx="1"/>
+            <a:endCxn id="5" idx="2"/>
+          </p:cNvCxnSpPr>
+          <p:nvPr/>
+        </p:nvCxnSpPr>
+        <p:spPr>
+          <a:xfrm rot="10800000">
+            <a:off x="3849759" y="3367271"/>
+            <a:ext cx="966744" cy="1499108"/>
+          </a:xfrm>
+          <a:prstGeom prst="bentConnector2">
+            <a:avLst/>
+          </a:prstGeom>
+          <a:ln>
+            <a:headEnd type="triangle"/>
+            <a:tailEnd type="triangle"/>
+          </a:ln>
+        </p:spPr>
+        <p:style>
+          <a:lnRef idx="1">
+            <a:schemeClr val="dk1"/>
+          </a:lnRef>
+          <a:fillRef idx="0">
+            <a:schemeClr val="dk1"/>
+          </a:fillRef>
+          <a:effectRef idx="0">
+            <a:schemeClr val="dk1"/>
+          </a:effectRef>
+          <a:fontRef idx="minor">
+            <a:schemeClr val="tx1"/>
+          </a:fontRef>
+        </p:style>
+      </p:cxnSp>
+      <p:cxnSp>
+        <p:nvCxnSpPr>
+          <p:cNvPr id="20" name="Connector: Elbow 19">
+            <a:extLst>
+              <a:ext uri="{FF2B5EF4-FFF2-40B4-BE49-F238E27FC236}">
+                <a16:creationId xmlns:a16="http://schemas.microsoft.com/office/drawing/2014/main" id="{0020035C-F093-4CA0-9E85-DB936AE53644}"/>
+              </a:ext>
+            </a:extLst>
+          </p:cNvPr>
+          <p:cNvCxnSpPr>
+            <a:stCxn id="5" idx="3"/>
+            <a:endCxn id="4" idx="1"/>
+          </p:cNvCxnSpPr>
+          <p:nvPr/>
+        </p:nvCxnSpPr>
+        <p:spPr>
+          <a:xfrm flipV="1">
+            <a:off x="4752231" y="2889633"/>
+            <a:ext cx="1362765" cy="3127"/>
+          </a:xfrm>
+          <a:prstGeom prst="bentConnector3">
+            <a:avLst/>
+          </a:prstGeom>
+          <a:ln>
+            <a:tailEnd type="triangle"/>
+          </a:ln>
+        </p:spPr>
+        <p:style>
+          <a:lnRef idx="1">
+            <a:schemeClr val="dk1"/>
+          </a:lnRef>
+          <a:fillRef idx="0">
+            <a:schemeClr val="dk1"/>
+          </a:fillRef>
+          <a:effectRef idx="0">
+            <a:schemeClr val="dk1"/>
+          </a:effectRef>
+          <a:fontRef idx="minor">
+            <a:schemeClr val="tx1"/>
+          </a:fontRef>
+        </p:style>
+      </p:cxnSp>
+      <p:cxnSp>
+        <p:nvCxnSpPr>
+          <p:cNvPr id="22" name="Connector: Elbow 21">
+            <a:extLst>
+              <a:ext uri="{FF2B5EF4-FFF2-40B4-BE49-F238E27FC236}">
+                <a16:creationId xmlns:a16="http://schemas.microsoft.com/office/drawing/2014/main" id="{45D4D979-1A34-451B-8DBB-BEDEC0A75E8F}"/>
+              </a:ext>
+            </a:extLst>
+          </p:cNvPr>
+          <p:cNvCxnSpPr>
+            <a:stCxn id="4" idx="3"/>
+            <a:endCxn id="6" idx="1"/>
+          </p:cNvCxnSpPr>
+          <p:nvPr/>
+        </p:nvCxnSpPr>
+        <p:spPr>
+          <a:xfrm>
+            <a:off x="8039212" y="2889633"/>
+            <a:ext cx="869788" cy="37500"/>
+          </a:xfrm>
+          <a:prstGeom prst="bentConnector3">
+            <a:avLst/>
+          </a:prstGeom>
+          <a:ln>
+            <a:headEnd type="triangle"/>
+            <a:tailEnd type="triangle"/>
+          </a:ln>
+        </p:spPr>
+        <p:style>
+          <a:lnRef idx="1">
+            <a:schemeClr val="dk1"/>
+          </a:lnRef>
+          <a:fillRef idx="0">
+            <a:schemeClr val="dk1"/>
+          </a:fillRef>
+          <a:effectRef idx="0">
+            <a:schemeClr val="dk1"/>
+          </a:effectRef>
+          <a:fontRef idx="minor">
+            <a:schemeClr val="tx1"/>
+          </a:fontRef>
+        </p:style>
+      </p:cxnSp>
+      <p:cxnSp>
+        <p:nvCxnSpPr>
+          <p:cNvPr id="24" name="Connector: Elbow 23">
+            <a:extLst>
+              <a:ext uri="{FF2B5EF4-FFF2-40B4-BE49-F238E27FC236}">
+                <a16:creationId xmlns:a16="http://schemas.microsoft.com/office/drawing/2014/main" id="{89CCB445-CEE4-4557-A280-BC22A6D86CCC}"/>
+              </a:ext>
+            </a:extLst>
+          </p:cNvPr>
+          <p:cNvCxnSpPr>
+            <a:cxnSpLocks/>
+            <a:stCxn id="8" idx="0"/>
+            <a:endCxn id="4" idx="2"/>
+          </p:cNvCxnSpPr>
+          <p:nvPr/>
+        </p:nvCxnSpPr>
+        <p:spPr>
+          <a:xfrm rot="16200000" flipV="1">
+            <a:off x="7964328" y="2473794"/>
+            <a:ext cx="996477" cy="2770924"/>
+          </a:xfrm>
+          <a:prstGeom prst="bentConnector3">
+            <a:avLst>
+              <a:gd name="adj1" fmla="val 50000"/>
+            </a:avLst>
+          </a:prstGeom>
+          <a:ln>
+            <a:tailEnd type="triangle"/>
+          </a:ln>
+        </p:spPr>
+        <p:style>
+          <a:lnRef idx="1">
+            <a:schemeClr val="dk1"/>
+          </a:lnRef>
+          <a:fillRef idx="0">
+            <a:schemeClr val="dk1"/>
+          </a:fillRef>
+          <a:effectRef idx="0">
+            <a:schemeClr val="dk1"/>
+          </a:effectRef>
+          <a:fontRef idx="minor">
+            <a:schemeClr val="tx1"/>
+          </a:fontRef>
+        </p:style>
+      </p:cxnSp>
+      <p:sp>
+        <p:nvSpPr>
+          <p:cNvPr id="49" name="TextBox 48">
+            <a:extLst>
+              <a:ext uri="{FF2B5EF4-FFF2-40B4-BE49-F238E27FC236}">
+                <a16:creationId xmlns:a16="http://schemas.microsoft.com/office/drawing/2014/main" id="{EC70072D-8FF6-4763-94B3-6CA55B160787}"/>
+              </a:ext>
+            </a:extLst>
+          </p:cNvPr>
+          <p:cNvSpPr txBox="1"/>
+          <p:nvPr/>
+        </p:nvSpPr>
+        <p:spPr>
+          <a:xfrm>
+            <a:off x="4890053" y="2418249"/>
+            <a:ext cx="1057524" cy="369332"/>
+          </a:xfrm>
+          <a:prstGeom prst="rect">
+            <a:avLst/>
+          </a:prstGeom>
+          <a:noFill/>
+        </p:spPr>
+        <p:txBody>
+          <a:bodyPr wrap="square" rtlCol="0">
+            <a:spAutoFit/>
+          </a:bodyPr>
+          <a:lstStyle/>
+          <a:p>
+            <a:r>
+              <a:rPr lang="en-AU" dirty="0"/>
+              <a:t>On Exit</a:t>
+            </a:r>
+          </a:p>
+        </p:txBody>
+      </p:sp>
+      <p:sp>
+        <p:nvSpPr>
+          <p:cNvPr id="52" name="TextBox 51">
+            <a:extLst>
+              <a:ext uri="{FF2B5EF4-FFF2-40B4-BE49-F238E27FC236}">
+                <a16:creationId xmlns:a16="http://schemas.microsoft.com/office/drawing/2014/main" id="{F9982033-CE3B-4198-879B-8779F6A20A4C}"/>
+              </a:ext>
+            </a:extLst>
+          </p:cNvPr>
+          <p:cNvSpPr txBox="1"/>
+          <p:nvPr/>
+        </p:nvSpPr>
+        <p:spPr>
+          <a:xfrm>
+            <a:off x="3070028" y="3610324"/>
+            <a:ext cx="738664" cy="1256055"/>
+          </a:xfrm>
+          <a:prstGeom prst="rect">
+            <a:avLst/>
+          </a:prstGeom>
+          <a:noFill/>
+        </p:spPr>
+        <p:txBody>
+          <a:bodyPr vert="eaVert" wrap="square" rtlCol="0">
+            <a:spAutoFit/>
+          </a:bodyPr>
+          <a:lstStyle/>
+          <a:p>
+            <a:r>
+              <a:rPr lang="en-AU" dirty="0"/>
+              <a:t>On Esc Key Press</a:t>
+            </a:r>
+          </a:p>
+        </p:txBody>
+      </p:sp>
+      <p:sp>
+        <p:nvSpPr>
+          <p:cNvPr id="56" name="TextBox 55">
+            <a:extLst>
+              <a:ext uri="{FF2B5EF4-FFF2-40B4-BE49-F238E27FC236}">
+                <a16:creationId xmlns:a16="http://schemas.microsoft.com/office/drawing/2014/main" id="{3F5BFBC5-4825-4DE3-9B5C-93B3CB0FB8E9}"/>
+              </a:ext>
+            </a:extLst>
+          </p:cNvPr>
+          <p:cNvSpPr txBox="1"/>
+          <p:nvPr/>
+        </p:nvSpPr>
+        <p:spPr>
+          <a:xfrm>
+            <a:off x="6997147" y="4961614"/>
+            <a:ext cx="1749287" cy="646331"/>
+          </a:xfrm>
+          <a:prstGeom prst="rect">
+            <a:avLst/>
+          </a:prstGeom>
+          <a:noFill/>
+        </p:spPr>
+        <p:txBody>
+          <a:bodyPr wrap="square" rtlCol="0">
+            <a:spAutoFit/>
+          </a:bodyPr>
+          <a:lstStyle/>
+          <a:p>
+            <a:r>
+              <a:rPr lang="en-AU" dirty="0"/>
+              <a:t>On All Entities Dead</a:t>
             </a:r>
           </a:p>
         </p:txBody>
@@ -4453,7 +5054,7 @@
     </p:spTree>
     <p:extLst>
       <p:ext uri="{BB962C8B-B14F-4D97-AF65-F5344CB8AC3E}">
-        <p14:creationId xmlns:p14="http://schemas.microsoft.com/office/powerpoint/2010/main" val="1793761052"/>
+        <p14:creationId xmlns:p14="http://schemas.microsoft.com/office/powerpoint/2010/main" val="2851200994"/>
       </p:ext>
     </p:extLst>
   </p:cSld>
@@ -4508,7 +5109,7 @@
           <a:p>
             <a:r>
               <a:rPr lang="en-AU" dirty="0"/>
-              <a:t>Credits State</a:t>
+              <a:t>Main Menu</a:t>
             </a:r>
           </a:p>
         </p:txBody>
@@ -4541,30 +5142,18 @@
           <a:p>
             <a:r>
               <a:rPr lang="en-AU" dirty="0"/>
-              <a:t>The Credits shows who made what.</a:t>
+              <a:t>The first screen seen when opening the game.</a:t>
             </a:r>
           </a:p>
           <a:p>
             <a:endParaRPr lang="en-AU" dirty="0"/>
-          </a:p>
-          <a:p>
-            <a:r>
-              <a:rPr lang="en-AU" dirty="0"/>
-              <a:t>Is accessed from:</a:t>
-            </a:r>
-          </a:p>
-          <a:p>
-            <a:r>
-              <a:rPr lang="en-AU" dirty="0"/>
-              <a:t>Main Menu</a:t>
-            </a:r>
           </a:p>
         </p:txBody>
       </p:sp>
     </p:spTree>
     <p:extLst>
       <p:ext uri="{BB962C8B-B14F-4D97-AF65-F5344CB8AC3E}">
-        <p14:creationId xmlns:p14="http://schemas.microsoft.com/office/powerpoint/2010/main" val="2881503629"/>
+        <p14:creationId xmlns:p14="http://schemas.microsoft.com/office/powerpoint/2010/main" val="1793761052"/>
       </p:ext>
     </p:extLst>
   </p:cSld>
@@ -4841,118 +5430,11 @@
           <a:p>
             <a:r>
               <a:rPr lang="en-AU" dirty="0"/>
-              <a:t>Game Over State</a:t>
-            </a:r>
-          </a:p>
-        </p:txBody>
-      </p:sp>
-      <p:sp>
-        <p:nvSpPr>
-          <p:cNvPr id="3" name="Subtitle 2">
-            <a:extLst>
-              <a:ext uri="{FF2B5EF4-FFF2-40B4-BE49-F238E27FC236}">
-                <a16:creationId xmlns:a16="http://schemas.microsoft.com/office/drawing/2014/main" id="{2BC5A390-3123-4129-9AD0-B6F121063F06}"/>
-              </a:ext>
-            </a:extLst>
-          </p:cNvPr>
-          <p:cNvSpPr>
-            <a:spLocks noGrp="1"/>
-          </p:cNvSpPr>
-          <p:nvPr>
-            <p:ph type="subTitle" idx="1"/>
-          </p:nvPr>
-        </p:nvSpPr>
-        <p:spPr>
-          <a:xfrm>
-            <a:off x="482600" y="2234316"/>
-            <a:ext cx="10506991" cy="3645275"/>
-          </a:xfrm>
-        </p:spPr>
-        <p:txBody>
-          <a:bodyPr/>
-          <a:lstStyle/>
-          <a:p>
-            <a:r>
-              <a:rPr lang="en-AU" dirty="0"/>
-              <a:t>Notifies the player that all entities are dead.</a:t>
-            </a:r>
-          </a:p>
-          <a:p>
-            <a:endParaRPr lang="en-AU" dirty="0"/>
-          </a:p>
-          <a:p>
-            <a:r>
-              <a:rPr lang="en-AU" dirty="0"/>
-              <a:t>Is accessed from:</a:t>
-            </a:r>
-          </a:p>
-          <a:p>
-            <a:r>
-              <a:rPr lang="en-AU" dirty="0"/>
-              <a:t>Play</a:t>
-            </a:r>
-          </a:p>
-        </p:txBody>
-      </p:sp>
-    </p:spTree>
-    <p:extLst>
-      <p:ext uri="{BB962C8B-B14F-4D97-AF65-F5344CB8AC3E}">
-        <p14:creationId xmlns:p14="http://schemas.microsoft.com/office/powerpoint/2010/main" val="430261682"/>
-      </p:ext>
-    </p:extLst>
-  </p:cSld>
-  <p:clrMapOvr>
-    <a:masterClrMapping/>
-  </p:clrMapOvr>
-</p:sld>
-</file>
-
-<file path=ppt/slides/slide15.xml><?xml version="1.0" encoding="utf-8"?>
-<p:sld xmlns:a="http://schemas.openxmlformats.org/drawingml/2006/main" xmlns:r="http://schemas.openxmlformats.org/officeDocument/2006/relationships" xmlns:p="http://schemas.openxmlformats.org/presentationml/2006/main">
-  <p:cSld>
-    <p:spTree>
-      <p:nvGrpSpPr>
-        <p:cNvPr id="1" name=""/>
-        <p:cNvGrpSpPr/>
-        <p:nvPr/>
-      </p:nvGrpSpPr>
-      <p:grpSpPr>
-        <a:xfrm>
-          <a:off x="0" y="0"/>
-          <a:ext cx="0" cy="0"/>
-          <a:chOff x="0" y="0"/>
-          <a:chExt cx="0" cy="0"/>
-        </a:xfrm>
-      </p:grpSpPr>
-      <p:sp>
-        <p:nvSpPr>
-          <p:cNvPr id="2" name="Title 1">
-            <a:extLst>
-              <a:ext uri="{FF2B5EF4-FFF2-40B4-BE49-F238E27FC236}">
-                <a16:creationId xmlns:a16="http://schemas.microsoft.com/office/drawing/2014/main" id="{84F877D3-839B-4465-B541-095409D6AD96}"/>
-              </a:ext>
-            </a:extLst>
-          </p:cNvPr>
-          <p:cNvSpPr>
-            <a:spLocks noGrp="1"/>
-          </p:cNvSpPr>
-          <p:nvPr>
-            <p:ph type="ctrTitle"/>
-          </p:nvPr>
-        </p:nvSpPr>
-        <p:spPr>
-          <a:xfrm>
-            <a:off x="482599" y="-540292"/>
-            <a:ext cx="10506991" cy="2531555"/>
-          </a:xfrm>
-        </p:spPr>
-        <p:txBody>
-          <a:bodyPr/>
-          <a:lstStyle/>
-          <a:p>
-            <a:r>
-              <a:rPr lang="en-AU" dirty="0"/>
-              <a:t>Global Config</a:t>
+              <a:t>Global Config </a:t>
+            </a:r>
+            <a:r>
+              <a:rPr lang="en-AU" sz="3200" dirty="0"/>
+              <a:t>(can all fit on a single page)</a:t>
             </a:r>
           </a:p>
         </p:txBody>
@@ -5250,7 +5732,7 @@
 </p:sld>
 </file>
 
-<file path=ppt/slides/slide16.xml><?xml version="1.0" encoding="utf-8"?>
+<file path=ppt/slides/slide15.xml><?xml version="1.0" encoding="utf-8"?>
 <p:sld xmlns:a="http://schemas.openxmlformats.org/drawingml/2006/main" xmlns:r="http://schemas.openxmlformats.org/officeDocument/2006/relationships" xmlns:p="http://schemas.openxmlformats.org/presentationml/2006/main">
   <p:cSld>
     <p:spTree>
@@ -5328,17 +5810,20 @@
           <a:p>
             <a:r>
               <a:rPr lang="en-AU" dirty="0"/>
-              <a:t>Controls:</a:t>
-            </a:r>
+              <a:t>Rabbit / Fox:</a:t>
+            </a:r>
+          </a:p>
+          <a:p>
+            <a:endParaRPr lang="en-AU" dirty="0"/>
           </a:p>
         </p:txBody>
       </p:sp>
       <p:graphicFrame>
         <p:nvGraphicFramePr>
-          <p:cNvPr id="5" name="Table 4">
-            <a:extLst>
-              <a:ext uri="{FF2B5EF4-FFF2-40B4-BE49-F238E27FC236}">
-                <a16:creationId xmlns:a16="http://schemas.microsoft.com/office/drawing/2014/main" id="{C5BD5421-4307-4D9C-89C6-EC9380A6EB99}"/>
+          <p:cNvPr id="6" name="Table 5">
+            <a:extLst>
+              <a:ext uri="{FF2B5EF4-FFF2-40B4-BE49-F238E27FC236}">
+                <a16:creationId xmlns:a16="http://schemas.microsoft.com/office/drawing/2014/main" id="{C2087D7B-3F83-4F14-899B-DE3B630C1E68}"/>
               </a:ext>
             </a:extLst>
           </p:cNvPr>
@@ -5348,532 +5833,14 @@
           <p:nvPr>
             <p:extLst>
               <p:ext uri="{D42A27DB-BD31-4B8C-83A1-F6EECF244321}">
-                <p14:modId xmlns:p14="http://schemas.microsoft.com/office/powerpoint/2010/main" val="2015728543"/>
+                <p14:modId xmlns:p14="http://schemas.microsoft.com/office/powerpoint/2010/main" val="1210456144"/>
               </p:ext>
             </p:extLst>
           </p:nvPr>
         </p:nvGraphicFramePr>
         <p:xfrm>
           <a:off x="576912" y="2802908"/>
-          <a:ext cx="10506990" cy="2865120"/>
-        </p:xfrm>
-        <a:graphic>
-          <a:graphicData uri="http://schemas.openxmlformats.org/drawingml/2006/table">
-            <a:tbl>
-              <a:tblPr firstRow="1" bandRow="1">
-                <a:tableStyleId>{5940675A-B579-460E-94D1-54222C63F5DA}</a:tableStyleId>
-              </a:tblPr>
-              <a:tblGrid>
-                <a:gridCol w="2388925">
-                  <a:extLst>
-                    <a:ext uri="{9D8B030D-6E8A-4147-A177-3AD203B41FA5}">
-                      <a16:colId xmlns:a16="http://schemas.microsoft.com/office/drawing/2014/main" val="621499468"/>
-                    </a:ext>
-                  </a:extLst>
-                </a:gridCol>
-                <a:gridCol w="1566406">
-                  <a:extLst>
-                    <a:ext uri="{9D8B030D-6E8A-4147-A177-3AD203B41FA5}">
-                      <a16:colId xmlns:a16="http://schemas.microsoft.com/office/drawing/2014/main" val="3359630475"/>
-                    </a:ext>
-                  </a:extLst>
-                </a:gridCol>
-                <a:gridCol w="6551659">
-                  <a:extLst>
-                    <a:ext uri="{9D8B030D-6E8A-4147-A177-3AD203B41FA5}">
-                      <a16:colId xmlns:a16="http://schemas.microsoft.com/office/drawing/2014/main" val="3872099904"/>
-                    </a:ext>
-                  </a:extLst>
-                </a:gridCol>
-              </a:tblGrid>
-              <a:tr h="370840">
-                <a:tc>
-                  <a:txBody>
-                    <a:bodyPr/>
-                    <a:lstStyle/>
-                    <a:p>
-                      <a:r>
-                        <a:rPr lang="en-AU" dirty="0"/>
-                        <a:t>Name</a:t>
-                      </a:r>
-                    </a:p>
-                  </a:txBody>
-                  <a:tcPr/>
-                </a:tc>
-                <a:tc>
-                  <a:txBody>
-                    <a:bodyPr/>
-                    <a:lstStyle/>
-                    <a:p>
-                      <a:r>
-                        <a:rPr lang="en-AU" dirty="0"/>
-                        <a:t>Type</a:t>
-                      </a:r>
-                    </a:p>
-                  </a:txBody>
-                  <a:tcPr/>
-                </a:tc>
-                <a:tc>
-                  <a:txBody>
-                    <a:bodyPr/>
-                    <a:lstStyle/>
-                    <a:p>
-                      <a:r>
-                        <a:rPr lang="en-AU" dirty="0"/>
-                        <a:t>Description</a:t>
-                      </a:r>
-                    </a:p>
-                  </a:txBody>
-                  <a:tcPr/>
-                </a:tc>
-                <a:extLst>
-                  <a:ext uri="{0D108BD9-81ED-4DB2-BD59-A6C34878D82A}">
-                    <a16:rowId xmlns:a16="http://schemas.microsoft.com/office/drawing/2014/main" val="4140898303"/>
-                  </a:ext>
-                </a:extLst>
-              </a:tr>
-              <a:tr h="370840">
-                <a:tc>
-                  <a:txBody>
-                    <a:bodyPr/>
-                    <a:lstStyle/>
-                    <a:p>
-                      <a:r>
-                        <a:rPr lang="en-AU" dirty="0" err="1"/>
-                        <a:t>upKey</a:t>
-                      </a:r>
-                      <a:endParaRPr lang="en-AU" dirty="0"/>
-                    </a:p>
-                  </a:txBody>
-                  <a:tcPr/>
-                </a:tc>
-                <a:tc>
-                  <a:txBody>
-                    <a:bodyPr/>
-                    <a:lstStyle/>
-                    <a:p>
-                      <a:r>
-                        <a:rPr lang="en-AU" dirty="0"/>
-                        <a:t>Int</a:t>
-                      </a:r>
-                    </a:p>
-                  </a:txBody>
-                  <a:tcPr/>
-                </a:tc>
-                <a:tc>
-                  <a:txBody>
-                    <a:bodyPr/>
-                    <a:lstStyle/>
-                    <a:p>
-                      <a:r>
-                        <a:rPr lang="en-AU" dirty="0"/>
-                        <a:t>‘W’ and ‘KEY_UP’ used to control menus and camera</a:t>
-                      </a:r>
-                    </a:p>
-                  </a:txBody>
-                  <a:tcPr/>
-                </a:tc>
-                <a:extLst>
-                  <a:ext uri="{0D108BD9-81ED-4DB2-BD59-A6C34878D82A}">
-                    <a16:rowId xmlns:a16="http://schemas.microsoft.com/office/drawing/2014/main" val="2128095031"/>
-                  </a:ext>
-                </a:extLst>
-              </a:tr>
-              <a:tr h="370840">
-                <a:tc>
-                  <a:txBody>
-                    <a:bodyPr/>
-                    <a:lstStyle/>
-                    <a:p>
-                      <a:r>
-                        <a:rPr lang="en-AU" dirty="0" err="1"/>
-                        <a:t>downKey</a:t>
-                      </a:r>
-                      <a:endParaRPr lang="en-AU" dirty="0"/>
-                    </a:p>
-                  </a:txBody>
-                  <a:tcPr/>
-                </a:tc>
-                <a:tc>
-                  <a:txBody>
-                    <a:bodyPr/>
-                    <a:lstStyle/>
-                    <a:p>
-                      <a:r>
-                        <a:rPr lang="en-AU" dirty="0"/>
-                        <a:t>Int</a:t>
-                      </a:r>
-                    </a:p>
-                  </a:txBody>
-                  <a:tcPr/>
-                </a:tc>
-                <a:tc>
-                  <a:txBody>
-                    <a:bodyPr/>
-                    <a:lstStyle/>
-                    <a:p>
-                      <a:r>
-                        <a:rPr lang="en-AU" dirty="0"/>
-                        <a:t>‘S’ and ‘KEY_DOWN’ used to control menus and camera</a:t>
-                      </a:r>
-                    </a:p>
-                  </a:txBody>
-                  <a:tcPr/>
-                </a:tc>
-                <a:extLst>
-                  <a:ext uri="{0D108BD9-81ED-4DB2-BD59-A6C34878D82A}">
-                    <a16:rowId xmlns:a16="http://schemas.microsoft.com/office/drawing/2014/main" val="4112973383"/>
-                  </a:ext>
-                </a:extLst>
-              </a:tr>
-              <a:tr h="370840">
-                <a:tc>
-                  <a:txBody>
-                    <a:bodyPr/>
-                    <a:lstStyle/>
-                    <a:p>
-                      <a:r>
-                        <a:rPr lang="en-AU" dirty="0" err="1"/>
-                        <a:t>leftKey</a:t>
-                      </a:r>
-                      <a:endParaRPr lang="en-AU" dirty="0"/>
-                    </a:p>
-                  </a:txBody>
-                  <a:tcPr/>
-                </a:tc>
-                <a:tc>
-                  <a:txBody>
-                    <a:bodyPr/>
-                    <a:lstStyle/>
-                    <a:p>
-                      <a:r>
-                        <a:rPr lang="en-AU" dirty="0"/>
-                        <a:t>Int</a:t>
-                      </a:r>
-                    </a:p>
-                  </a:txBody>
-                  <a:tcPr/>
-                </a:tc>
-                <a:tc>
-                  <a:txBody>
-                    <a:bodyPr/>
-                    <a:lstStyle/>
-                    <a:p>
-                      <a:r>
-                        <a:rPr lang="en-AU" dirty="0"/>
-                        <a:t>‘S’ and ‘KEY_LEFT’ used to control camera</a:t>
-                      </a:r>
-                    </a:p>
-                  </a:txBody>
-                  <a:tcPr/>
-                </a:tc>
-                <a:extLst>
-                  <a:ext uri="{0D108BD9-81ED-4DB2-BD59-A6C34878D82A}">
-                    <a16:rowId xmlns:a16="http://schemas.microsoft.com/office/drawing/2014/main" val="1698527674"/>
-                  </a:ext>
-                </a:extLst>
-              </a:tr>
-              <a:tr h="370840">
-                <a:tc>
-                  <a:txBody>
-                    <a:bodyPr/>
-                    <a:lstStyle/>
-                    <a:p>
-                      <a:r>
-                        <a:rPr lang="en-AU" dirty="0" err="1"/>
-                        <a:t>rightKey</a:t>
-                      </a:r>
-                      <a:endParaRPr lang="en-AU" dirty="0"/>
-                    </a:p>
-                  </a:txBody>
-                  <a:tcPr/>
-                </a:tc>
-                <a:tc>
-                  <a:txBody>
-                    <a:bodyPr/>
-                    <a:lstStyle/>
-                    <a:p>
-                      <a:r>
-                        <a:rPr lang="en-AU" dirty="0"/>
-                        <a:t>Int</a:t>
-                      </a:r>
-                    </a:p>
-                  </a:txBody>
-                  <a:tcPr/>
-                </a:tc>
-                <a:tc>
-                  <a:txBody>
-                    <a:bodyPr/>
-                    <a:lstStyle/>
-                    <a:p>
-                      <a:r>
-                        <a:rPr lang="en-AU" dirty="0"/>
-                        <a:t>‘D’ and ‘KEY_RIGHT’ used to control camera</a:t>
-                      </a:r>
-                    </a:p>
-                  </a:txBody>
-                  <a:tcPr/>
-                </a:tc>
-                <a:extLst>
-                  <a:ext uri="{0D108BD9-81ED-4DB2-BD59-A6C34878D82A}">
-                    <a16:rowId xmlns:a16="http://schemas.microsoft.com/office/drawing/2014/main" val="3899359864"/>
-                  </a:ext>
-                </a:extLst>
-              </a:tr>
-              <a:tr h="370840">
-                <a:tc>
-                  <a:txBody>
-                    <a:bodyPr/>
-                    <a:lstStyle/>
-                    <a:p>
-                      <a:r>
-                        <a:rPr lang="en-AU" dirty="0" err="1"/>
-                        <a:t>activateKey</a:t>
-                      </a:r>
-                      <a:endParaRPr lang="en-AU" dirty="0"/>
-                    </a:p>
-                  </a:txBody>
-                  <a:tcPr/>
-                </a:tc>
-                <a:tc>
-                  <a:txBody>
-                    <a:bodyPr/>
-                    <a:lstStyle/>
-                    <a:p>
-                      <a:r>
-                        <a:rPr lang="en-AU" dirty="0"/>
-                        <a:t>Int</a:t>
-                      </a:r>
-                    </a:p>
-                  </a:txBody>
-                  <a:tcPr/>
-                </a:tc>
-                <a:tc>
-                  <a:txBody>
-                    <a:bodyPr/>
-                    <a:lstStyle/>
-                    <a:p>
-                      <a:pPr marL="0" marR="0" lvl="0" indent="0" algn="l" defTabSz="914400" rtl="0" eaLnBrk="1" fontAlgn="auto" latinLnBrk="0" hangingPunct="1">
-                        <a:lnSpc>
-                          <a:spcPct val="100000"/>
-                        </a:lnSpc>
-                        <a:spcBef>
-                          <a:spcPts val="0"/>
-                        </a:spcBef>
-                        <a:spcAft>
-                          <a:spcPts val="0"/>
-                        </a:spcAft>
-                        <a:buClrTx/>
-                        <a:buSzTx/>
-                        <a:buFontTx/>
-                        <a:buNone/>
-                        <a:tabLst/>
-                        <a:defRPr/>
-                      </a:pPr>
-                      <a:r>
-                        <a:rPr lang="en-AU" dirty="0"/>
-                        <a:t>‘MOUSE_LEFT_BUTTON’ and ‘KEY_ENTER’ used to activate selection in menus.</a:t>
-                      </a:r>
-                    </a:p>
-                  </a:txBody>
-                  <a:tcPr/>
-                </a:tc>
-                <a:extLst>
-                  <a:ext uri="{0D108BD9-81ED-4DB2-BD59-A6C34878D82A}">
-                    <a16:rowId xmlns:a16="http://schemas.microsoft.com/office/drawing/2014/main" val="1793067708"/>
-                  </a:ext>
-                </a:extLst>
-              </a:tr>
-              <a:tr h="370840">
-                <a:tc>
-                  <a:txBody>
-                    <a:bodyPr/>
-                    <a:lstStyle/>
-                    <a:p>
-                      <a:r>
-                        <a:rPr lang="en-AU" dirty="0" err="1"/>
-                        <a:t>pauseKey</a:t>
-                      </a:r>
-                      <a:endParaRPr lang="en-AU" dirty="0"/>
-                    </a:p>
-                  </a:txBody>
-                  <a:tcPr/>
-                </a:tc>
-                <a:tc>
-                  <a:txBody>
-                    <a:bodyPr/>
-                    <a:lstStyle/>
-                    <a:p>
-                      <a:r>
-                        <a:rPr lang="en-AU" dirty="0"/>
-                        <a:t>Int</a:t>
-                      </a:r>
-                    </a:p>
-                  </a:txBody>
-                  <a:tcPr/>
-                </a:tc>
-                <a:tc>
-                  <a:txBody>
-                    <a:bodyPr/>
-                    <a:lstStyle/>
-                    <a:p>
-                      <a:pPr marL="0" marR="0" lvl="0" indent="0" algn="l" defTabSz="914400" rtl="0" eaLnBrk="1" fontAlgn="auto" latinLnBrk="0" hangingPunct="1">
-                        <a:lnSpc>
-                          <a:spcPct val="100000"/>
-                        </a:lnSpc>
-                        <a:spcBef>
-                          <a:spcPts val="0"/>
-                        </a:spcBef>
-                        <a:spcAft>
-                          <a:spcPts val="0"/>
-                        </a:spcAft>
-                        <a:buClrTx/>
-                        <a:buSzTx/>
-                        <a:buFontTx/>
-                        <a:buNone/>
-                        <a:tabLst/>
-                        <a:defRPr/>
-                      </a:pPr>
-                      <a:r>
-                        <a:rPr lang="en-AU" dirty="0"/>
-                        <a:t>‘KEY_ESC’ used to open the pause menu</a:t>
-                      </a:r>
-                    </a:p>
-                  </a:txBody>
-                  <a:tcPr/>
-                </a:tc>
-                <a:extLst>
-                  <a:ext uri="{0D108BD9-81ED-4DB2-BD59-A6C34878D82A}">
-                    <a16:rowId xmlns:a16="http://schemas.microsoft.com/office/drawing/2014/main" val="158052575"/>
-                  </a:ext>
-                </a:extLst>
-              </a:tr>
-            </a:tbl>
-          </a:graphicData>
-        </a:graphic>
-      </p:graphicFrame>
-    </p:spTree>
-    <p:extLst>
-      <p:ext uri="{BB962C8B-B14F-4D97-AF65-F5344CB8AC3E}">
-        <p14:creationId xmlns:p14="http://schemas.microsoft.com/office/powerpoint/2010/main" val="12659808"/>
-      </p:ext>
-    </p:extLst>
-  </p:cSld>
-  <p:clrMapOvr>
-    <a:masterClrMapping/>
-  </p:clrMapOvr>
-</p:sld>
-</file>
-
-<file path=ppt/slides/slide17.xml><?xml version="1.0" encoding="utf-8"?>
-<p:sld xmlns:a="http://schemas.openxmlformats.org/drawingml/2006/main" xmlns:r="http://schemas.openxmlformats.org/officeDocument/2006/relationships" xmlns:p="http://schemas.openxmlformats.org/presentationml/2006/main">
-  <p:cSld>
-    <p:spTree>
-      <p:nvGrpSpPr>
-        <p:cNvPr id="1" name=""/>
-        <p:cNvGrpSpPr/>
-        <p:nvPr/>
-      </p:nvGrpSpPr>
-      <p:grpSpPr>
-        <a:xfrm>
-          <a:off x="0" y="0"/>
-          <a:ext cx="0" cy="0"/>
-          <a:chOff x="0" y="0"/>
-          <a:chExt cx="0" cy="0"/>
-        </a:xfrm>
-      </p:grpSpPr>
-      <p:sp>
-        <p:nvSpPr>
-          <p:cNvPr id="2" name="Title 1">
-            <a:extLst>
-              <a:ext uri="{FF2B5EF4-FFF2-40B4-BE49-F238E27FC236}">
-                <a16:creationId xmlns:a16="http://schemas.microsoft.com/office/drawing/2014/main" id="{84F877D3-839B-4465-B541-095409D6AD96}"/>
-              </a:ext>
-            </a:extLst>
-          </p:cNvPr>
-          <p:cNvSpPr>
-            <a:spLocks noGrp="1"/>
-          </p:cNvSpPr>
-          <p:nvPr>
-            <p:ph type="ctrTitle"/>
-          </p:nvPr>
-        </p:nvSpPr>
-        <p:spPr>
-          <a:xfrm>
-            <a:off x="482599" y="-540292"/>
-            <a:ext cx="10506991" cy="2531555"/>
-          </a:xfrm>
-        </p:spPr>
-        <p:txBody>
-          <a:bodyPr/>
-          <a:lstStyle/>
-          <a:p>
-            <a:r>
-              <a:rPr lang="en-AU" dirty="0"/>
-              <a:t>Global Config</a:t>
-            </a:r>
-          </a:p>
-        </p:txBody>
-      </p:sp>
-      <p:sp>
-        <p:nvSpPr>
-          <p:cNvPr id="3" name="Subtitle 2">
-            <a:extLst>
-              <a:ext uri="{FF2B5EF4-FFF2-40B4-BE49-F238E27FC236}">
-                <a16:creationId xmlns:a16="http://schemas.microsoft.com/office/drawing/2014/main" id="{2BC5A390-3123-4129-9AD0-B6F121063F06}"/>
-              </a:ext>
-            </a:extLst>
-          </p:cNvPr>
-          <p:cNvSpPr>
-            <a:spLocks noGrp="1"/>
-          </p:cNvSpPr>
-          <p:nvPr>
-            <p:ph type="subTitle" idx="1"/>
-          </p:nvPr>
-        </p:nvSpPr>
-        <p:spPr>
-          <a:xfrm>
-            <a:off x="482600" y="2234316"/>
-            <a:ext cx="10506991" cy="3645275"/>
-          </a:xfrm>
-        </p:spPr>
-        <p:txBody>
-          <a:bodyPr/>
-          <a:lstStyle/>
-          <a:p>
-            <a:r>
-              <a:rPr lang="en-AU" dirty="0"/>
-              <a:t>Rabbit / Fox:</a:t>
-            </a:r>
-          </a:p>
-          <a:p>
-            <a:endParaRPr lang="en-AU" dirty="0"/>
-          </a:p>
-        </p:txBody>
-      </p:sp>
-      <p:graphicFrame>
-        <p:nvGraphicFramePr>
-          <p:cNvPr id="6" name="Table 5">
-            <a:extLst>
-              <a:ext uri="{FF2B5EF4-FFF2-40B4-BE49-F238E27FC236}">
-                <a16:creationId xmlns:a16="http://schemas.microsoft.com/office/drawing/2014/main" id="{C2087D7B-3F83-4F14-899B-DE3B630C1E68}"/>
-              </a:ext>
-            </a:extLst>
-          </p:cNvPr>
-          <p:cNvGraphicFramePr>
-            <a:graphicFrameLocks noGrp="1"/>
-          </p:cNvGraphicFramePr>
-          <p:nvPr>
-            <p:extLst>
-              <p:ext uri="{D42A27DB-BD31-4B8C-83A1-F6EECF244321}">
-                <p14:modId xmlns:p14="http://schemas.microsoft.com/office/powerpoint/2010/main" val="226126580"/>
-              </p:ext>
-            </p:extLst>
-          </p:nvPr>
-        </p:nvGraphicFramePr>
-        <p:xfrm>
-          <a:off x="576912" y="2802908"/>
-          <a:ext cx="10506990" cy="2966720"/>
+          <a:ext cx="10506990" cy="741680"/>
         </p:xfrm>
         <a:graphic>
           <a:graphicData uri="http://schemas.openxmlformats.org/drawingml/2006/table">
@@ -5938,539 +5905,6 @@
                     <a:lstStyle/>
                     <a:p>
                       <a:r>
-                        <a:rPr lang="en-AU"/>
-                        <a:t>Description</a:t>
-                      </a:r>
-                      <a:endParaRPr lang="en-AU" dirty="0"/>
-                    </a:p>
-                  </a:txBody>
-                  <a:tcPr/>
-                </a:tc>
-                <a:extLst>
-                  <a:ext uri="{0D108BD9-81ED-4DB2-BD59-A6C34878D82A}">
-                    <a16:rowId xmlns:a16="http://schemas.microsoft.com/office/drawing/2014/main" val="4140898303"/>
-                  </a:ext>
-                </a:extLst>
-              </a:tr>
-              <a:tr h="370840">
-                <a:tc>
-                  <a:txBody>
-                    <a:bodyPr/>
-                    <a:lstStyle/>
-                    <a:p>
-                      <a:r>
-                        <a:rPr lang="en-AU"/>
-                        <a:t>moveSpeed</a:t>
-                      </a:r>
-                      <a:endParaRPr lang="en-AU" dirty="0"/>
-                    </a:p>
-                  </a:txBody>
-                  <a:tcPr/>
-                </a:tc>
-                <a:tc>
-                  <a:txBody>
-                    <a:bodyPr/>
-                    <a:lstStyle/>
-                    <a:p>
-                      <a:r>
-                        <a:rPr lang="en-AU" dirty="0"/>
-                        <a:t>Vec2&lt;float&gt;</a:t>
-                      </a:r>
-                    </a:p>
-                  </a:txBody>
-                  <a:tcPr/>
-                </a:tc>
-                <a:tc>
-                  <a:txBody>
-                    <a:bodyPr/>
-                    <a:lstStyle/>
-                    <a:p>
-                      <a:r>
-                        <a:rPr lang="en-AU"/>
-                        <a:t>Controls the speed of the Rabbit</a:t>
-                      </a:r>
-                      <a:endParaRPr lang="en-AU" dirty="0"/>
-                    </a:p>
-                  </a:txBody>
-                  <a:tcPr/>
-                </a:tc>
-                <a:extLst>
-                  <a:ext uri="{0D108BD9-81ED-4DB2-BD59-A6C34878D82A}">
-                    <a16:rowId xmlns:a16="http://schemas.microsoft.com/office/drawing/2014/main" val="2128095031"/>
-                  </a:ext>
-                </a:extLst>
-              </a:tr>
-              <a:tr h="370840">
-                <a:tc>
-                  <a:txBody>
-                    <a:bodyPr/>
-                    <a:lstStyle/>
-                    <a:p>
-                      <a:r>
-                        <a:rPr lang="en-AU"/>
-                        <a:t>hunger</a:t>
-                      </a:r>
-                      <a:endParaRPr lang="en-AU" dirty="0"/>
-                    </a:p>
-                  </a:txBody>
-                  <a:tcPr/>
-                </a:tc>
-                <a:tc>
-                  <a:txBody>
-                    <a:bodyPr/>
-                    <a:lstStyle/>
-                    <a:p>
-                      <a:r>
-                        <a:rPr lang="en-AU"/>
-                        <a:t>Float</a:t>
-                      </a:r>
-                      <a:endParaRPr lang="en-AU" dirty="0"/>
-                    </a:p>
-                  </a:txBody>
-                  <a:tcPr/>
-                </a:tc>
-                <a:tc>
-                  <a:txBody>
-                    <a:bodyPr/>
-                    <a:lstStyle/>
-                    <a:p>
-                      <a:r>
-                        <a:rPr lang="en-AU" dirty="0"/>
-                        <a:t>How hungry the Rabbit is, if 0 Rabbit dies.</a:t>
-                      </a:r>
-                    </a:p>
-                  </a:txBody>
-                  <a:tcPr/>
-                </a:tc>
-                <a:extLst>
-                  <a:ext uri="{0D108BD9-81ED-4DB2-BD59-A6C34878D82A}">
-                    <a16:rowId xmlns:a16="http://schemas.microsoft.com/office/drawing/2014/main" val="2192066316"/>
-                  </a:ext>
-                </a:extLst>
-              </a:tr>
-              <a:tr h="370840">
-                <a:tc>
-                  <a:txBody>
-                    <a:bodyPr/>
-                    <a:lstStyle/>
-                    <a:p>
-                      <a:r>
-                        <a:rPr lang="en-AU" dirty="0"/>
-                        <a:t>thirst </a:t>
-                      </a:r>
-                    </a:p>
-                  </a:txBody>
-                  <a:tcPr/>
-                </a:tc>
-                <a:tc>
-                  <a:txBody>
-                    <a:bodyPr/>
-                    <a:lstStyle/>
-                    <a:p>
-                      <a:r>
-                        <a:rPr lang="en-AU" dirty="0"/>
-                        <a:t>Float</a:t>
-                      </a:r>
-                    </a:p>
-                  </a:txBody>
-                  <a:tcPr/>
-                </a:tc>
-                <a:tc>
-                  <a:txBody>
-                    <a:bodyPr/>
-                    <a:lstStyle/>
-                    <a:p>
-                      <a:r>
-                        <a:rPr lang="en-AU" dirty="0"/>
-                        <a:t>How thirsty the Rabbit is, if 0 Rabbit dies</a:t>
-                      </a:r>
-                    </a:p>
-                  </a:txBody>
-                  <a:tcPr/>
-                </a:tc>
-                <a:extLst>
-                  <a:ext uri="{0D108BD9-81ED-4DB2-BD59-A6C34878D82A}">
-                    <a16:rowId xmlns:a16="http://schemas.microsoft.com/office/drawing/2014/main" val="2739220930"/>
-                  </a:ext>
-                </a:extLst>
-              </a:tr>
-              <a:tr h="370840">
-                <a:tc>
-                  <a:txBody>
-                    <a:bodyPr/>
-                    <a:lstStyle/>
-                    <a:p>
-                      <a:r>
-                        <a:rPr lang="en-AU" dirty="0" err="1"/>
-                        <a:t>hungerSpeed</a:t>
-                      </a:r>
-                      <a:endParaRPr lang="en-AU" dirty="0"/>
-                    </a:p>
-                  </a:txBody>
-                  <a:tcPr/>
-                </a:tc>
-                <a:tc>
-                  <a:txBody>
-                    <a:bodyPr/>
-                    <a:lstStyle/>
-                    <a:p>
-                      <a:r>
-                        <a:rPr lang="en-AU" dirty="0"/>
-                        <a:t>Float</a:t>
-                      </a:r>
-                    </a:p>
-                  </a:txBody>
-                  <a:tcPr/>
-                </a:tc>
-                <a:tc>
-                  <a:txBody>
-                    <a:bodyPr/>
-                    <a:lstStyle/>
-                    <a:p>
-                      <a:r>
-                        <a:rPr lang="en-AU" dirty="0"/>
-                        <a:t>How fast the hunger counts down</a:t>
-                      </a:r>
-                    </a:p>
-                  </a:txBody>
-                  <a:tcPr/>
-                </a:tc>
-                <a:extLst>
-                  <a:ext uri="{0D108BD9-81ED-4DB2-BD59-A6C34878D82A}">
-                    <a16:rowId xmlns:a16="http://schemas.microsoft.com/office/drawing/2014/main" val="292551845"/>
-                  </a:ext>
-                </a:extLst>
-              </a:tr>
-              <a:tr h="370840">
-                <a:tc>
-                  <a:txBody>
-                    <a:bodyPr/>
-                    <a:lstStyle/>
-                    <a:p>
-                      <a:r>
-                        <a:rPr lang="en-AU" dirty="0" err="1"/>
-                        <a:t>thirstSpeed</a:t>
-                      </a:r>
-                      <a:endParaRPr lang="en-AU" dirty="0"/>
-                    </a:p>
-                  </a:txBody>
-                  <a:tcPr/>
-                </a:tc>
-                <a:tc>
-                  <a:txBody>
-                    <a:bodyPr/>
-                    <a:lstStyle/>
-                    <a:p>
-                      <a:r>
-                        <a:rPr lang="en-AU" dirty="0"/>
-                        <a:t>Float</a:t>
-                      </a:r>
-                    </a:p>
-                  </a:txBody>
-                  <a:tcPr/>
-                </a:tc>
-                <a:tc>
-                  <a:txBody>
-                    <a:bodyPr/>
-                    <a:lstStyle/>
-                    <a:p>
-                      <a:r>
-                        <a:rPr lang="en-AU" dirty="0"/>
-                        <a:t>How fast the thirst counts down</a:t>
-                      </a:r>
-                    </a:p>
-                  </a:txBody>
-                  <a:tcPr/>
-                </a:tc>
-                <a:extLst>
-                  <a:ext uri="{0D108BD9-81ED-4DB2-BD59-A6C34878D82A}">
-                    <a16:rowId xmlns:a16="http://schemas.microsoft.com/office/drawing/2014/main" val="106585834"/>
-                  </a:ext>
-                </a:extLst>
-              </a:tr>
-              <a:tr h="370840">
-                <a:tc>
-                  <a:txBody>
-                    <a:bodyPr/>
-                    <a:lstStyle/>
-                    <a:p>
-                      <a:r>
-                        <a:rPr lang="en-AU" dirty="0" err="1"/>
-                        <a:t>maxHunger</a:t>
-                      </a:r>
-                      <a:endParaRPr lang="en-AU" dirty="0"/>
-                    </a:p>
-                  </a:txBody>
-                  <a:tcPr/>
-                </a:tc>
-                <a:tc>
-                  <a:txBody>
-                    <a:bodyPr/>
-                    <a:lstStyle/>
-                    <a:p>
-                      <a:r>
-                        <a:rPr lang="en-AU" dirty="0"/>
-                        <a:t>Float</a:t>
-                      </a:r>
-                    </a:p>
-                  </a:txBody>
-                  <a:tcPr/>
-                </a:tc>
-                <a:tc>
-                  <a:txBody>
-                    <a:bodyPr/>
-                    <a:lstStyle/>
-                    <a:p>
-                      <a:r>
-                        <a:rPr lang="en-AU" dirty="0"/>
-                        <a:t>The max number for hunger</a:t>
-                      </a:r>
-                    </a:p>
-                  </a:txBody>
-                  <a:tcPr/>
-                </a:tc>
-                <a:extLst>
-                  <a:ext uri="{0D108BD9-81ED-4DB2-BD59-A6C34878D82A}">
-                    <a16:rowId xmlns:a16="http://schemas.microsoft.com/office/drawing/2014/main" val="2502393475"/>
-                  </a:ext>
-                </a:extLst>
-              </a:tr>
-              <a:tr h="370840">
-                <a:tc>
-                  <a:txBody>
-                    <a:bodyPr/>
-                    <a:lstStyle/>
-                    <a:p>
-                      <a:r>
-                        <a:rPr lang="en-AU" dirty="0" err="1"/>
-                        <a:t>maxThirst</a:t>
-                      </a:r>
-                      <a:endParaRPr lang="en-AU" dirty="0"/>
-                    </a:p>
-                  </a:txBody>
-                  <a:tcPr/>
-                </a:tc>
-                <a:tc>
-                  <a:txBody>
-                    <a:bodyPr/>
-                    <a:lstStyle/>
-                    <a:p>
-                      <a:r>
-                        <a:rPr lang="en-AU" dirty="0"/>
-                        <a:t>Float</a:t>
-                      </a:r>
-                    </a:p>
-                  </a:txBody>
-                  <a:tcPr/>
-                </a:tc>
-                <a:tc>
-                  <a:txBody>
-                    <a:bodyPr/>
-                    <a:lstStyle/>
-                    <a:p>
-                      <a:r>
-                        <a:rPr lang="en-AU" dirty="0"/>
-                        <a:t>The max number for thirst</a:t>
-                      </a:r>
-                    </a:p>
-                  </a:txBody>
-                  <a:tcPr/>
-                </a:tc>
-                <a:extLst>
-                  <a:ext uri="{0D108BD9-81ED-4DB2-BD59-A6C34878D82A}">
-                    <a16:rowId xmlns:a16="http://schemas.microsoft.com/office/drawing/2014/main" val="3415422813"/>
-                  </a:ext>
-                </a:extLst>
-              </a:tr>
-            </a:tbl>
-          </a:graphicData>
-        </a:graphic>
-      </p:graphicFrame>
-    </p:spTree>
-    <p:extLst>
-      <p:ext uri="{BB962C8B-B14F-4D97-AF65-F5344CB8AC3E}">
-        <p14:creationId xmlns:p14="http://schemas.microsoft.com/office/powerpoint/2010/main" val="2315885972"/>
-      </p:ext>
-    </p:extLst>
-  </p:cSld>
-  <p:clrMapOvr>
-    <a:masterClrMapping/>
-  </p:clrMapOvr>
-</p:sld>
-</file>
-
-<file path=ppt/slides/slide18.xml><?xml version="1.0" encoding="utf-8"?>
-<p:sld xmlns:a="http://schemas.openxmlformats.org/drawingml/2006/main" xmlns:r="http://schemas.openxmlformats.org/officeDocument/2006/relationships" xmlns:p="http://schemas.openxmlformats.org/presentationml/2006/main">
-  <p:cSld>
-    <p:spTree>
-      <p:nvGrpSpPr>
-        <p:cNvPr id="1" name=""/>
-        <p:cNvGrpSpPr/>
-        <p:nvPr/>
-      </p:nvGrpSpPr>
-      <p:grpSpPr>
-        <a:xfrm>
-          <a:off x="0" y="0"/>
-          <a:ext cx="0" cy="0"/>
-          <a:chOff x="0" y="0"/>
-          <a:chExt cx="0" cy="0"/>
-        </a:xfrm>
-      </p:grpSpPr>
-      <p:sp>
-        <p:nvSpPr>
-          <p:cNvPr id="2" name="Title 1">
-            <a:extLst>
-              <a:ext uri="{FF2B5EF4-FFF2-40B4-BE49-F238E27FC236}">
-                <a16:creationId xmlns:a16="http://schemas.microsoft.com/office/drawing/2014/main" id="{84F877D3-839B-4465-B541-095409D6AD96}"/>
-              </a:ext>
-            </a:extLst>
-          </p:cNvPr>
-          <p:cNvSpPr>
-            <a:spLocks noGrp="1"/>
-          </p:cNvSpPr>
-          <p:nvPr>
-            <p:ph type="ctrTitle"/>
-          </p:nvPr>
-        </p:nvSpPr>
-        <p:spPr>
-          <a:xfrm>
-            <a:off x="482599" y="-540292"/>
-            <a:ext cx="10506991" cy="2531555"/>
-          </a:xfrm>
-        </p:spPr>
-        <p:txBody>
-          <a:bodyPr/>
-          <a:lstStyle/>
-          <a:p>
-            <a:r>
-              <a:rPr lang="en-AU" dirty="0"/>
-              <a:t>Global Config</a:t>
-            </a:r>
-          </a:p>
-        </p:txBody>
-      </p:sp>
-      <p:sp>
-        <p:nvSpPr>
-          <p:cNvPr id="3" name="Subtitle 2">
-            <a:extLst>
-              <a:ext uri="{FF2B5EF4-FFF2-40B4-BE49-F238E27FC236}">
-                <a16:creationId xmlns:a16="http://schemas.microsoft.com/office/drawing/2014/main" id="{2BC5A390-3123-4129-9AD0-B6F121063F06}"/>
-              </a:ext>
-            </a:extLst>
-          </p:cNvPr>
-          <p:cNvSpPr>
-            <a:spLocks noGrp="1"/>
-          </p:cNvSpPr>
-          <p:nvPr>
-            <p:ph type="subTitle" idx="1"/>
-          </p:nvPr>
-        </p:nvSpPr>
-        <p:spPr>
-          <a:xfrm>
-            <a:off x="482600" y="2234316"/>
-            <a:ext cx="10506991" cy="3645275"/>
-          </a:xfrm>
-        </p:spPr>
-        <p:txBody>
-          <a:bodyPr/>
-          <a:lstStyle/>
-          <a:p>
-            <a:r>
-              <a:rPr lang="en-AU" dirty="0"/>
-              <a:t>Berry Bush:</a:t>
-            </a:r>
-          </a:p>
-          <a:p>
-            <a:endParaRPr lang="en-AU" dirty="0"/>
-          </a:p>
-        </p:txBody>
-      </p:sp>
-      <p:graphicFrame>
-        <p:nvGraphicFramePr>
-          <p:cNvPr id="5" name="Table 4">
-            <a:extLst>
-              <a:ext uri="{FF2B5EF4-FFF2-40B4-BE49-F238E27FC236}">
-                <a16:creationId xmlns:a16="http://schemas.microsoft.com/office/drawing/2014/main" id="{BA44A117-BADC-4439-8B94-D365A2BBB7E2}"/>
-              </a:ext>
-            </a:extLst>
-          </p:cNvPr>
-          <p:cNvGraphicFramePr>
-            <a:graphicFrameLocks noGrp="1"/>
-          </p:cNvGraphicFramePr>
-          <p:nvPr>
-            <p:extLst>
-              <p:ext uri="{D42A27DB-BD31-4B8C-83A1-F6EECF244321}">
-                <p14:modId xmlns:p14="http://schemas.microsoft.com/office/powerpoint/2010/main" val="3249700051"/>
-              </p:ext>
-            </p:extLst>
-          </p:nvPr>
-        </p:nvGraphicFramePr>
-        <p:xfrm>
-          <a:off x="576912" y="2802908"/>
-          <a:ext cx="10506990" cy="741680"/>
-        </p:xfrm>
-        <a:graphic>
-          <a:graphicData uri="http://schemas.openxmlformats.org/drawingml/2006/table">
-            <a:tbl>
-              <a:tblPr firstRow="1" bandRow="1">
-                <a:tableStyleId>{5940675A-B579-460E-94D1-54222C63F5DA}</a:tableStyleId>
-              </a:tblPr>
-              <a:tblGrid>
-                <a:gridCol w="2388925">
-                  <a:extLst>
-                    <a:ext uri="{9D8B030D-6E8A-4147-A177-3AD203B41FA5}">
-                      <a16:colId xmlns:a16="http://schemas.microsoft.com/office/drawing/2014/main" val="621499468"/>
-                    </a:ext>
-                  </a:extLst>
-                </a:gridCol>
-                <a:gridCol w="1566406">
-                  <a:extLst>
-                    <a:ext uri="{9D8B030D-6E8A-4147-A177-3AD203B41FA5}">
-                      <a16:colId xmlns:a16="http://schemas.microsoft.com/office/drawing/2014/main" val="3359630475"/>
-                    </a:ext>
-                  </a:extLst>
-                </a:gridCol>
-                <a:gridCol w="6551659">
-                  <a:extLst>
-                    <a:ext uri="{9D8B030D-6E8A-4147-A177-3AD203B41FA5}">
-                      <a16:colId xmlns:a16="http://schemas.microsoft.com/office/drawing/2014/main" val="3872099904"/>
-                    </a:ext>
-                  </a:extLst>
-                </a:gridCol>
-              </a:tblGrid>
-              <a:tr h="370840">
-                <a:tc>
-                  <a:txBody>
-                    <a:bodyPr/>
-                    <a:lstStyle/>
-                    <a:p>
-                      <a:r>
-                        <a:rPr lang="en-AU" dirty="0"/>
-                        <a:t>Name</a:t>
-                      </a:r>
-                    </a:p>
-                  </a:txBody>
-                  <a:tcPr/>
-                </a:tc>
-                <a:tc>
-                  <a:txBody>
-                    <a:bodyPr/>
-                    <a:lstStyle/>
-                    <a:p>
-                      <a:r>
-                        <a:rPr lang="en-AU" dirty="0"/>
-                        <a:t>Type</a:t>
-                      </a:r>
-                    </a:p>
-                  </a:txBody>
-                  <a:tcPr/>
-                </a:tc>
-                <a:tc>
-                  <a:txBody>
-                    <a:bodyPr/>
-                    <a:lstStyle/>
-                    <a:p>
-                      <a:r>
                         <a:rPr lang="en-AU" dirty="0"/>
                         <a:t>Description</a:t>
                       </a:r>
@@ -6492,8 +5926,21 @@
                     <a:p>
                       <a:r>
                         <a:rPr lang="en-AU" dirty="0" err="1"/>
-                        <a:t>refillTimer</a:t>
+                        <a:t>gameObject</a:t>
                       </a:r>
+                      <a:r>
+                        <a:rPr lang="en-AU" dirty="0"/>
+                        <a:t> variables</a:t>
+                      </a:r>
+                    </a:p>
+                  </a:txBody>
+                  <a:tcPr/>
+                </a:tc>
+                <a:tc>
+                  <a:txBody>
+                    <a:bodyPr/>
+                    <a:lstStyle/>
+                    <a:p>
                       <a:endParaRPr lang="en-AU" dirty="0"/>
                     </a:p>
                   </a:txBody>
@@ -6504,30 +5951,14 @@
                     <a:bodyPr/>
                     <a:lstStyle/>
                     <a:p>
-                      <a:r>
-                        <a:rPr lang="en-AU" dirty="0"/>
-                        <a:t>Float</a:t>
-                      </a:r>
-                    </a:p>
-                  </a:txBody>
-                  <a:tcPr/>
-                </a:tc>
-                <a:tc>
-                  <a:txBody>
-                    <a:bodyPr/>
-                    <a:lstStyle/>
-                    <a:p>
-                      <a:r>
-                        <a:rPr lang="en-AU" dirty="0"/>
-                        <a:t>The time it takes for the an empty berry bush to replenish</a:t>
-                      </a:r>
+                      <a:endParaRPr lang="en-AU" dirty="0"/>
                     </a:p>
                   </a:txBody>
                   <a:tcPr/>
                 </a:tc>
                 <a:extLst>
                   <a:ext uri="{0D108BD9-81ED-4DB2-BD59-A6C34878D82A}">
-                    <a16:rowId xmlns:a16="http://schemas.microsoft.com/office/drawing/2014/main" val="2128095031"/>
+                    <a16:rowId xmlns:a16="http://schemas.microsoft.com/office/drawing/2014/main" val="2478426214"/>
                   </a:ext>
                 </a:extLst>
               </a:tr>
@@ -6538,7 +5969,7 @@
     </p:spTree>
     <p:extLst>
       <p:ext uri="{BB962C8B-B14F-4D97-AF65-F5344CB8AC3E}">
-        <p14:creationId xmlns:p14="http://schemas.microsoft.com/office/powerpoint/2010/main" val="3709396519"/>
+        <p14:creationId xmlns:p14="http://schemas.microsoft.com/office/powerpoint/2010/main" val="2315885972"/>
       </p:ext>
     </p:extLst>
   </p:cSld>
@@ -6548,7 +5979,7 @@
 </p:sld>
 </file>
 
-<file path=ppt/slides/slide19.xml><?xml version="1.0" encoding="utf-8"?>
+<file path=ppt/slides/slide16.xml><?xml version="1.0" encoding="utf-8"?>
 <p:sld xmlns:a="http://schemas.openxmlformats.org/drawingml/2006/main" xmlns:r="http://schemas.openxmlformats.org/officeDocument/2006/relationships" xmlns:p="http://schemas.openxmlformats.org/presentationml/2006/main">
   <p:cSld>
     <p:spTree>
@@ -7035,109 +6466,7 @@
 </p:sld>
 </file>
 
-<file path=ppt/slides/slide2.xml><?xml version="1.0" encoding="utf-8"?>
-<p:sld xmlns:a="http://schemas.openxmlformats.org/drawingml/2006/main" xmlns:r="http://schemas.openxmlformats.org/officeDocument/2006/relationships" xmlns:p="http://schemas.openxmlformats.org/presentationml/2006/main">
-  <p:cSld>
-    <p:spTree>
-      <p:nvGrpSpPr>
-        <p:cNvPr id="1" name=""/>
-        <p:cNvGrpSpPr/>
-        <p:nvPr/>
-      </p:nvGrpSpPr>
-      <p:grpSpPr>
-        <a:xfrm>
-          <a:off x="0" y="0"/>
-          <a:ext cx="0" cy="0"/>
-          <a:chOff x="0" y="0"/>
-          <a:chExt cx="0" cy="0"/>
-        </a:xfrm>
-      </p:grpSpPr>
-      <p:sp>
-        <p:nvSpPr>
-          <p:cNvPr id="2" name="Title 1">
-            <a:extLst>
-              <a:ext uri="{FF2B5EF4-FFF2-40B4-BE49-F238E27FC236}">
-                <a16:creationId xmlns:a16="http://schemas.microsoft.com/office/drawing/2014/main" id="{84F877D3-839B-4465-B541-095409D6AD96}"/>
-              </a:ext>
-            </a:extLst>
-          </p:cNvPr>
-          <p:cNvSpPr>
-            <a:spLocks noGrp="1"/>
-          </p:cNvSpPr>
-          <p:nvPr>
-            <p:ph type="ctrTitle"/>
-          </p:nvPr>
-        </p:nvSpPr>
-        <p:spPr>
-          <a:xfrm>
-            <a:off x="482599" y="-540292"/>
-            <a:ext cx="10506991" cy="2531555"/>
-          </a:xfrm>
-        </p:spPr>
-        <p:txBody>
-          <a:bodyPr/>
-          <a:lstStyle/>
-          <a:p>
-            <a:r>
-              <a:rPr lang="en-AU" dirty="0"/>
-              <a:t>The Forest</a:t>
-            </a:r>
-          </a:p>
-        </p:txBody>
-      </p:sp>
-      <p:sp>
-        <p:nvSpPr>
-          <p:cNvPr id="3" name="Subtitle 2">
-            <a:extLst>
-              <a:ext uri="{FF2B5EF4-FFF2-40B4-BE49-F238E27FC236}">
-                <a16:creationId xmlns:a16="http://schemas.microsoft.com/office/drawing/2014/main" id="{2BC5A390-3123-4129-9AD0-B6F121063F06}"/>
-              </a:ext>
-            </a:extLst>
-          </p:cNvPr>
-          <p:cNvSpPr>
-            <a:spLocks noGrp="1"/>
-          </p:cNvSpPr>
-          <p:nvPr>
-            <p:ph type="subTitle" idx="1"/>
-          </p:nvPr>
-        </p:nvSpPr>
-        <p:spPr>
-          <a:xfrm>
-            <a:off x="482600" y="2234316"/>
-            <a:ext cx="10506991" cy="3645275"/>
-          </a:xfrm>
-        </p:spPr>
-        <p:txBody>
-          <a:bodyPr/>
-          <a:lstStyle/>
-          <a:p>
-            <a:r>
-              <a:rPr lang="en-AU" dirty="0"/>
-              <a:t>Pitch:</a:t>
-            </a:r>
-          </a:p>
-          <a:p>
-            <a:r>
-              <a:rPr lang="en-AU" dirty="0"/>
-              <a:t>TODO</a:t>
-            </a:r>
-          </a:p>
-        </p:txBody>
-      </p:sp>
-    </p:spTree>
-    <p:extLst>
-      <p:ext uri="{BB962C8B-B14F-4D97-AF65-F5344CB8AC3E}">
-        <p14:creationId xmlns:p14="http://schemas.microsoft.com/office/powerpoint/2010/main" val="294298077"/>
-      </p:ext>
-    </p:extLst>
-  </p:cSld>
-  <p:clrMapOvr>
-    <a:masterClrMapping/>
-  </p:clrMapOvr>
-</p:sld>
-</file>
-
-<file path=ppt/slides/slide20.xml><?xml version="1.0" encoding="utf-8"?>
+<file path=ppt/slides/slide17.xml><?xml version="1.0" encoding="utf-8"?>
 <p:sld xmlns:a="http://schemas.openxmlformats.org/drawingml/2006/main" xmlns:r="http://schemas.openxmlformats.org/officeDocument/2006/relationships" xmlns:p="http://schemas.openxmlformats.org/presentationml/2006/main">
   <p:cSld>
     <p:spTree>
@@ -7313,6 +6642,108 @@
 </p:sld>
 </file>
 
+<file path=ppt/slides/slide2.xml><?xml version="1.0" encoding="utf-8"?>
+<p:sld xmlns:a="http://schemas.openxmlformats.org/drawingml/2006/main" xmlns:r="http://schemas.openxmlformats.org/officeDocument/2006/relationships" xmlns:p="http://schemas.openxmlformats.org/presentationml/2006/main">
+  <p:cSld>
+    <p:spTree>
+      <p:nvGrpSpPr>
+        <p:cNvPr id="1" name=""/>
+        <p:cNvGrpSpPr/>
+        <p:nvPr/>
+      </p:nvGrpSpPr>
+      <p:grpSpPr>
+        <a:xfrm>
+          <a:off x="0" y="0"/>
+          <a:ext cx="0" cy="0"/>
+          <a:chOff x="0" y="0"/>
+          <a:chExt cx="0" cy="0"/>
+        </a:xfrm>
+      </p:grpSpPr>
+      <p:sp>
+        <p:nvSpPr>
+          <p:cNvPr id="2" name="Title 1">
+            <a:extLst>
+              <a:ext uri="{FF2B5EF4-FFF2-40B4-BE49-F238E27FC236}">
+                <a16:creationId xmlns:a16="http://schemas.microsoft.com/office/drawing/2014/main" id="{84F877D3-839B-4465-B541-095409D6AD96}"/>
+              </a:ext>
+            </a:extLst>
+          </p:cNvPr>
+          <p:cNvSpPr>
+            <a:spLocks noGrp="1"/>
+          </p:cNvSpPr>
+          <p:nvPr>
+            <p:ph type="ctrTitle"/>
+          </p:nvPr>
+        </p:nvSpPr>
+        <p:spPr>
+          <a:xfrm>
+            <a:off x="482599" y="-540292"/>
+            <a:ext cx="10506991" cy="2531555"/>
+          </a:xfrm>
+        </p:spPr>
+        <p:txBody>
+          <a:bodyPr/>
+          <a:lstStyle/>
+          <a:p>
+            <a:r>
+              <a:rPr lang="en-AU" dirty="0"/>
+              <a:t>The Forest</a:t>
+            </a:r>
+          </a:p>
+        </p:txBody>
+      </p:sp>
+      <p:sp>
+        <p:nvSpPr>
+          <p:cNvPr id="3" name="Subtitle 2">
+            <a:extLst>
+              <a:ext uri="{FF2B5EF4-FFF2-40B4-BE49-F238E27FC236}">
+                <a16:creationId xmlns:a16="http://schemas.microsoft.com/office/drawing/2014/main" id="{2BC5A390-3123-4129-9AD0-B6F121063F06}"/>
+              </a:ext>
+            </a:extLst>
+          </p:cNvPr>
+          <p:cNvSpPr>
+            <a:spLocks noGrp="1"/>
+          </p:cNvSpPr>
+          <p:nvPr>
+            <p:ph type="subTitle" idx="1"/>
+          </p:nvPr>
+        </p:nvSpPr>
+        <p:spPr>
+          <a:xfrm>
+            <a:off x="482600" y="2234316"/>
+            <a:ext cx="10506991" cy="3645275"/>
+          </a:xfrm>
+        </p:spPr>
+        <p:txBody>
+          <a:bodyPr/>
+          <a:lstStyle/>
+          <a:p>
+            <a:r>
+              <a:rPr lang="en-AU" dirty="0"/>
+              <a:t>Pitch:</a:t>
+            </a:r>
+          </a:p>
+          <a:p>
+            <a:r>
+              <a:rPr lang="en-AU" dirty="0"/>
+              <a:t>TODO</a:t>
+            </a:r>
+          </a:p>
+        </p:txBody>
+      </p:sp>
+    </p:spTree>
+    <p:extLst>
+      <p:ext uri="{BB962C8B-B14F-4D97-AF65-F5344CB8AC3E}">
+        <p14:creationId xmlns:p14="http://schemas.microsoft.com/office/powerpoint/2010/main" val="294298077"/>
+      </p:ext>
+    </p:extLst>
+  </p:cSld>
+  <p:clrMapOvr>
+    <a:masterClrMapping/>
+  </p:clrMapOvr>
+</p:sld>
+</file>
+
 <file path=ppt/slides/slide3.xml><?xml version="1.0" encoding="utf-8"?>
 <p:sld xmlns:a="http://schemas.openxmlformats.org/drawingml/2006/main" xmlns:r="http://schemas.openxmlformats.org/officeDocument/2006/relationships" xmlns:p="http://schemas.openxmlformats.org/presentationml/2006/main">
   <p:cSld>
@@ -7403,23 +6834,8 @@
           <a:p>
             <a:r>
               <a:rPr lang="en-AU" dirty="0"/>
-              <a:t>Eats berries from bushes</a:t>
-            </a:r>
-          </a:p>
-          <a:p>
-            <a:r>
-              <a:rPr lang="en-AU" dirty="0"/>
-              <a:t>Drinks water from lakes</a:t>
-            </a:r>
-          </a:p>
-          <a:p>
-            <a:r>
-              <a:rPr lang="en-AU" dirty="0"/>
-              <a:t>Hides in Rabbit Holes when being chased by Fox</a:t>
-            </a:r>
-          </a:p>
-          <a:p>
-            <a:endParaRPr lang="en-AU" dirty="0"/>
+              <a:t>Runs away from fox</a:t>
+            </a:r>
           </a:p>
         </p:txBody>
       </p:sp>
@@ -7474,7 +6890,7 @@
         <p:spPr>
           <a:xfrm>
             <a:off x="6331891" y="2228671"/>
-            <a:ext cx="5054376" cy="1938992"/>
+            <a:ext cx="5054376" cy="1200329"/>
           </a:xfrm>
           <a:prstGeom prst="rect">
             <a:avLst/>
@@ -7502,18 +6918,6 @@
             <a:r>
               <a:rPr lang="en-AU" sz="2400" dirty="0"/>
               <a:t>Chases Rabbit for food</a:t>
-            </a:r>
-          </a:p>
-          <a:p>
-            <a:r>
-              <a:rPr lang="en-AU" sz="2400" dirty="0"/>
-              <a:t>Drinks water from lake</a:t>
-            </a:r>
-          </a:p>
-          <a:p>
-            <a:r>
-              <a:rPr lang="en-AU" sz="2400" dirty="0"/>
-              <a:t>Cannot access Rabbit Holes</a:t>
             </a:r>
           </a:p>
         </p:txBody>
@@ -7612,7 +7016,7 @@
           <a:p>
             <a:r>
               <a:rPr lang="en-AU" dirty="0"/>
-              <a:t>Rabbit</a:t>
+              <a:t>Rabbit Behaviours</a:t>
             </a:r>
           </a:p>
         </p:txBody>
@@ -7644,36 +7048,33 @@
           <a:lstStyle/>
           <a:p>
             <a:r>
+              <a:rPr lang="en-AU" b="1" dirty="0"/>
+              <a:t>Wander</a:t>
+            </a:r>
+            <a:r>
               <a:rPr lang="en-AU" dirty="0"/>
-              <a:t>States:</a:t>
-            </a:r>
-          </a:p>
-          <a:p>
+              <a:t> – The Rabbits default state is Wander, during Wander the rabbit will randomly move around the map until prompted otherwise.</a:t>
+            </a:r>
+          </a:p>
+          <a:p>
+            <a:r>
+              <a:rPr lang="en-AU" b="1" dirty="0"/>
+              <a:t>Flee </a:t>
+            </a:r>
             <a:r>
               <a:rPr lang="en-AU" dirty="0"/>
-              <a:t>Wander – The Rabbits default state is Wander, during Wander the rabbit will randomly move around the map until prompted otherwise.</a:t>
-            </a:r>
-          </a:p>
-          <a:p>
+              <a:t>– When the Fox is within a certain radius the rabbit will flee, running in the opposite direction of the fox.</a:t>
+            </a:r>
+          </a:p>
+          <a:p>
+            <a:r>
+              <a:rPr lang="en-AU" b="1" dirty="0"/>
+              <a:t>Follow Path </a:t>
+            </a:r>
             <a:r>
               <a:rPr lang="en-AU" dirty="0"/>
-              <a:t>Flee – When the Fox is within a certain radius the rabbit will flee, running in the opposite direction of the fox.</a:t>
-            </a:r>
-          </a:p>
-          <a:p>
-            <a:r>
-              <a:rPr lang="en-AU" dirty="0"/>
-              <a:t>Seek – The Seek state is active when looking for food, water, or when fleeing from Fox and a Rabbit Hole comes into a certain radius.</a:t>
-            </a:r>
-          </a:p>
-          <a:p>
-            <a:r>
-              <a:rPr lang="en-AU" dirty="0"/>
-              <a:t>Hiding – This state is active when the Rabbit is in a hole hiding from Fox</a:t>
-            </a:r>
-          </a:p>
-          <a:p>
-            <a:endParaRPr lang="en-AU" dirty="0"/>
+              <a:t>- TODO</a:t>
+            </a:r>
           </a:p>
         </p:txBody>
       </p:sp>
@@ -7735,7 +7136,7 @@
           <a:p>
             <a:r>
               <a:rPr lang="en-AU" dirty="0"/>
-              <a:t>Fox</a:t>
+              <a:t>Fox Behaviours</a:t>
             </a:r>
           </a:p>
         </p:txBody>
@@ -7767,21 +7168,36 @@
           <a:lstStyle/>
           <a:p>
             <a:r>
+              <a:rPr lang="en-AU" b="1" dirty="0"/>
+              <a:t>Wander</a:t>
+            </a:r>
+            <a:r>
               <a:rPr lang="en-AU" dirty="0"/>
-              <a:t>States:</a:t>
-            </a:r>
-          </a:p>
-          <a:p>
+              <a:t> – Fox’s default state is Wander, during Wander the Fox will randomly move around the map until prompted otherwise.</a:t>
+            </a:r>
+          </a:p>
+          <a:p>
+            <a:r>
+              <a:rPr lang="en-AU" b="1" dirty="0"/>
+              <a:t>Seek</a:t>
+            </a:r>
             <a:r>
               <a:rPr lang="en-AU" dirty="0"/>
-              <a:t>Wander – Fox’s default state is Wander, during Wander the Fox will randomly move around the map until prompted otherwise.</a:t>
-            </a:r>
-          </a:p>
-          <a:p>
+              <a:t> - The Seek state is active when looking for food or water.</a:t>
+            </a:r>
+          </a:p>
+          <a:p>
+            <a:r>
+              <a:rPr lang="en-AU" b="1" dirty="0"/>
+              <a:t>Follow Path </a:t>
+            </a:r>
             <a:r>
               <a:rPr lang="en-AU" dirty="0"/>
-              <a:t>Seek - The Seek state is active when looking for food or water.</a:t>
-            </a:r>
+              <a:t>- TODO</a:t>
+            </a:r>
+          </a:p>
+          <a:p>
+            <a:endParaRPr lang="en-AU" dirty="0"/>
           </a:p>
         </p:txBody>
       </p:sp>
@@ -7820,7 +7236,7 @@
           <p:cNvPr id="2" name="Title 1">
             <a:extLst>
               <a:ext uri="{FF2B5EF4-FFF2-40B4-BE49-F238E27FC236}">
-                <a16:creationId xmlns:a16="http://schemas.microsoft.com/office/drawing/2014/main" id="{84F877D3-839B-4465-B541-095409D6AD96}"/>
+                <a16:creationId xmlns:a16="http://schemas.microsoft.com/office/drawing/2014/main" id="{DA8C2E17-AB58-4DC2-9342-0BEE6EF145B1}"/>
               </a:ext>
             </a:extLst>
           </p:cNvPr>
@@ -7831,19 +7247,14 @@
             <p:ph type="ctrTitle"/>
           </p:nvPr>
         </p:nvSpPr>
-        <p:spPr>
-          <a:xfrm>
-            <a:off x="482599" y="-540292"/>
-            <a:ext cx="10506991" cy="2531555"/>
-          </a:xfrm>
-        </p:spPr>
+        <p:spPr/>
         <p:txBody>
           <a:bodyPr/>
           <a:lstStyle/>
           <a:p>
             <a:r>
               <a:rPr lang="en-AU" dirty="0"/>
-              <a:t>Berry Bush</a:t>
+              <a:t>Decision tree fox rabbit</a:t>
             </a:r>
           </a:p>
         </p:txBody>
@@ -7853,7 +7264,7 @@
           <p:cNvPr id="3" name="Subtitle 2">
             <a:extLst>
               <a:ext uri="{FF2B5EF4-FFF2-40B4-BE49-F238E27FC236}">
-                <a16:creationId xmlns:a16="http://schemas.microsoft.com/office/drawing/2014/main" id="{2BC5A390-3123-4129-9AD0-B6F121063F06}"/>
+                <a16:creationId xmlns:a16="http://schemas.microsoft.com/office/drawing/2014/main" id="{DAD95E87-2EE3-4A6D-9BD5-6995E70084CA}"/>
               </a:ext>
             </a:extLst>
           </p:cNvPr>
@@ -7864,39 +7275,19 @@
             <p:ph type="subTitle" idx="1"/>
           </p:nvPr>
         </p:nvSpPr>
-        <p:spPr>
-          <a:xfrm>
-            <a:off x="482600" y="2234316"/>
-            <a:ext cx="10506991" cy="3645275"/>
-          </a:xfrm>
-        </p:spPr>
+        <p:spPr/>
         <p:txBody>
           <a:bodyPr/>
           <a:lstStyle/>
           <a:p>
-            <a:r>
-              <a:rPr lang="en-AU" dirty="0"/>
-              <a:t>States: (stretch goal)</a:t>
-            </a:r>
-          </a:p>
-          <a:p>
-            <a:r>
-              <a:rPr lang="en-AU" dirty="0"/>
-              <a:t>Full – The Full state is when the bush has berries and can be eaten by Rabbit.</a:t>
-            </a:r>
-          </a:p>
-          <a:p>
-            <a:r>
-              <a:rPr lang="en-AU" dirty="0"/>
-              <a:t>Empty – The Empty state is when the bush has no berries and cannot be eaten by Rabbit.</a:t>
-            </a:r>
+            <a:endParaRPr lang="en-AU"/>
           </a:p>
         </p:txBody>
       </p:sp>
     </p:spTree>
     <p:extLst>
       <p:ext uri="{BB962C8B-B14F-4D97-AF65-F5344CB8AC3E}">
-        <p14:creationId xmlns:p14="http://schemas.microsoft.com/office/powerpoint/2010/main" val="1913319802"/>
+        <p14:creationId xmlns:p14="http://schemas.microsoft.com/office/powerpoint/2010/main" val="2285635208"/>
       </p:ext>
     </p:extLst>
   </p:cSld>
@@ -7907,6 +7298,179 @@
 </file>
 
 <file path=ppt/slides/slide7.xml><?xml version="1.0" encoding="utf-8"?>
+<p:sld xmlns:a="http://schemas.openxmlformats.org/drawingml/2006/main" xmlns:r="http://schemas.openxmlformats.org/officeDocument/2006/relationships" xmlns:p="http://schemas.openxmlformats.org/presentationml/2006/main">
+  <p:cSld>
+    <p:spTree>
+      <p:nvGrpSpPr>
+        <p:cNvPr id="1" name=""/>
+        <p:cNvGrpSpPr/>
+        <p:nvPr/>
+      </p:nvGrpSpPr>
+      <p:grpSpPr>
+        <a:xfrm>
+          <a:off x="0" y="0"/>
+          <a:ext cx="0" cy="0"/>
+          <a:chOff x="0" y="0"/>
+          <a:chExt cx="0" cy="0"/>
+        </a:xfrm>
+      </p:grpSpPr>
+      <p:sp>
+        <p:nvSpPr>
+          <p:cNvPr id="2" name="Title 1">
+            <a:extLst>
+              <a:ext uri="{FF2B5EF4-FFF2-40B4-BE49-F238E27FC236}">
+                <a16:creationId xmlns:a16="http://schemas.microsoft.com/office/drawing/2014/main" id="{C1A0E5E4-AC82-4E38-B456-2D734976E68F}"/>
+              </a:ext>
+            </a:extLst>
+          </p:cNvPr>
+          <p:cNvSpPr>
+            <a:spLocks noGrp="1"/>
+          </p:cNvSpPr>
+          <p:nvPr>
+            <p:ph type="title"/>
+          </p:nvPr>
+        </p:nvSpPr>
+        <p:spPr/>
+        <p:txBody>
+          <a:bodyPr/>
+          <a:lstStyle/>
+          <a:p>
+            <a:r>
+              <a:rPr lang="en-AU" dirty="0"/>
+              <a:t>What  the path finding is doing</a:t>
+            </a:r>
+          </a:p>
+        </p:txBody>
+      </p:sp>
+      <p:sp>
+        <p:nvSpPr>
+          <p:cNvPr id="3" name="Content Placeholder 2">
+            <a:extLst>
+              <a:ext uri="{FF2B5EF4-FFF2-40B4-BE49-F238E27FC236}">
+                <a16:creationId xmlns:a16="http://schemas.microsoft.com/office/drawing/2014/main" id="{74DEC562-FAC8-4669-87C7-CCF9C637D006}"/>
+              </a:ext>
+            </a:extLst>
+          </p:cNvPr>
+          <p:cNvSpPr>
+            <a:spLocks noGrp="1"/>
+          </p:cNvSpPr>
+          <p:nvPr>
+            <p:ph idx="1"/>
+          </p:nvPr>
+        </p:nvSpPr>
+        <p:spPr/>
+        <p:txBody>
+          <a:bodyPr/>
+          <a:lstStyle/>
+          <a:p>
+            <a:endParaRPr lang="en-AU"/>
+          </a:p>
+        </p:txBody>
+      </p:sp>
+    </p:spTree>
+    <p:extLst>
+      <p:ext uri="{BB962C8B-B14F-4D97-AF65-F5344CB8AC3E}">
+        <p14:creationId xmlns:p14="http://schemas.microsoft.com/office/powerpoint/2010/main" val="2499306643"/>
+      </p:ext>
+    </p:extLst>
+  </p:cSld>
+  <p:clrMapOvr>
+    <a:masterClrMapping/>
+  </p:clrMapOvr>
+</p:sld>
+</file>
+
+<file path=ppt/slides/slide8.xml><?xml version="1.0" encoding="utf-8"?>
+<p:sld xmlns:a="http://schemas.openxmlformats.org/drawingml/2006/main" xmlns:r="http://schemas.openxmlformats.org/officeDocument/2006/relationships" xmlns:p="http://schemas.openxmlformats.org/presentationml/2006/main">
+  <p:cSld>
+    <p:spTree>
+      <p:nvGrpSpPr>
+        <p:cNvPr id="1" name=""/>
+        <p:cNvGrpSpPr/>
+        <p:nvPr/>
+      </p:nvGrpSpPr>
+      <p:grpSpPr>
+        <a:xfrm>
+          <a:off x="0" y="0"/>
+          <a:ext cx="0" cy="0"/>
+          <a:chOff x="0" y="0"/>
+          <a:chExt cx="0" cy="0"/>
+        </a:xfrm>
+      </p:grpSpPr>
+      <p:sp>
+        <p:nvSpPr>
+          <p:cNvPr id="2" name="Title 1">
+            <a:extLst>
+              <a:ext uri="{FF2B5EF4-FFF2-40B4-BE49-F238E27FC236}">
+                <a16:creationId xmlns:a16="http://schemas.microsoft.com/office/drawing/2014/main" id="{53DB8D51-D019-4C64-85CE-B63A046C4784}"/>
+              </a:ext>
+            </a:extLst>
+          </p:cNvPr>
+          <p:cNvSpPr>
+            <a:spLocks noGrp="1"/>
+          </p:cNvSpPr>
+          <p:nvPr>
+            <p:ph type="title"/>
+          </p:nvPr>
+        </p:nvSpPr>
+        <p:spPr/>
+        <p:txBody>
+          <a:bodyPr/>
+          <a:lstStyle/>
+          <a:p>
+            <a:r>
+              <a:rPr lang="en-AU" dirty="0"/>
+              <a:t>How is graph generated</a:t>
+            </a:r>
+          </a:p>
+        </p:txBody>
+      </p:sp>
+      <p:sp>
+        <p:nvSpPr>
+          <p:cNvPr id="3" name="Content Placeholder 2">
+            <a:extLst>
+              <a:ext uri="{FF2B5EF4-FFF2-40B4-BE49-F238E27FC236}">
+                <a16:creationId xmlns:a16="http://schemas.microsoft.com/office/drawing/2014/main" id="{A133EE58-9F8C-424D-8248-118F3BC1BD1F}"/>
+              </a:ext>
+            </a:extLst>
+          </p:cNvPr>
+          <p:cNvSpPr>
+            <a:spLocks noGrp="1"/>
+          </p:cNvSpPr>
+          <p:nvPr>
+            <p:ph idx="1"/>
+          </p:nvPr>
+        </p:nvSpPr>
+        <p:spPr/>
+        <p:txBody>
+          <a:bodyPr/>
+          <a:lstStyle/>
+          <a:p>
+            <a:r>
+              <a:rPr lang="en-AU" dirty="0"/>
+              <a:t>What can and cant </a:t>
+            </a:r>
+            <a:r>
+              <a:rPr lang="en-AU"/>
+              <a:t>be walked on</a:t>
+            </a:r>
+          </a:p>
+        </p:txBody>
+      </p:sp>
+    </p:spTree>
+    <p:extLst>
+      <p:ext uri="{BB962C8B-B14F-4D97-AF65-F5344CB8AC3E}">
+        <p14:creationId xmlns:p14="http://schemas.microsoft.com/office/powerpoint/2010/main" val="663717010"/>
+      </p:ext>
+    </p:extLst>
+  </p:cSld>
+  <p:clrMapOvr>
+    <a:masterClrMapping/>
+  </p:clrMapOvr>
+</p:sld>
+</file>
+
+<file path=ppt/slides/slide9.xml><?xml version="1.0" encoding="utf-8"?>
 <p:sld xmlns:a="http://schemas.openxmlformats.org/drawingml/2006/main" xmlns:r="http://schemas.openxmlformats.org/officeDocument/2006/relationships" xmlns:p="http://schemas.openxmlformats.org/presentationml/2006/main">
   <p:cSld>
     <p:spTree>
@@ -8186,7 +7750,7 @@
         </p:nvSpPr>
         <p:spPr>
           <a:xfrm>
-            <a:off x="482600" y="4490114"/>
+            <a:off x="482599" y="4484912"/>
             <a:ext cx="3087537" cy="628154"/>
           </a:xfrm>
           <a:prstGeom prst="homePlate">
@@ -8281,7 +7845,7 @@
                 <a:latin typeface="Courier New" panose="02070309020205020404" pitchFamily="49" charset="0"/>
                 <a:cs typeface="Courier New" panose="02070309020205020404" pitchFamily="49" charset="0"/>
               </a:rPr>
-              <a:t>1</a:t>
+              <a:t>1-2</a:t>
             </a:r>
           </a:p>
         </p:txBody>
@@ -10281,14 +9845,14 @@
           <p:nvPr>
             <p:extLst>
               <p:ext uri="{D42A27DB-BD31-4B8C-83A1-F6EECF244321}">
-                <p14:modId xmlns:p14="http://schemas.microsoft.com/office/powerpoint/2010/main" val="3470738790"/>
+                <p14:modId xmlns:p14="http://schemas.microsoft.com/office/powerpoint/2010/main" val="430428568"/>
               </p:ext>
             </p:extLst>
           </p:nvPr>
         </p:nvGraphicFramePr>
         <p:xfrm>
           <a:off x="6199367" y="3315629"/>
-          <a:ext cx="3397857" cy="1854200"/>
+          <a:ext cx="3397857" cy="1483360"/>
         </p:xfrm>
         <a:graphic>
           <a:graphicData uri="http://schemas.openxmlformats.org/drawingml/2006/table">
@@ -10735,7 +10299,7 @@
                             <a:schemeClr val="tx1"/>
                           </a:solidFill>
                         </a:rPr>
-                        <a:t>2</a:t>
+                        <a:t>2 </a:t>
                       </a:r>
                     </a:p>
                   </a:txBody>
@@ -10800,7 +10364,7 @@
                             <a:schemeClr val="tx1"/>
                           </a:solidFill>
                         </a:rPr>
-                        <a:t>Drink</a:t>
+                        <a:t>Die</a:t>
                       </a:r>
                     </a:p>
                   </a:txBody>
@@ -10856,144 +10420,7 @@
                 </a:tc>
                 <a:extLst>
                   <a:ext uri="{0D108BD9-81ED-4DB2-BD59-A6C34878D82A}">
-                    <a16:rowId xmlns:a16="http://schemas.microsoft.com/office/drawing/2014/main" val="3392549509"/>
-                  </a:ext>
-                </a:extLst>
-              </a:tr>
-              <a:tr h="370840">
-                <a:tc>
-                  <a:txBody>
-                    <a:bodyPr/>
-                    <a:lstStyle/>
-                    <a:p>
-                      <a:r>
-                        <a:rPr lang="en-AU" b="0" dirty="0">
-                          <a:solidFill>
-                            <a:schemeClr val="tx1"/>
-                          </a:solidFill>
-                        </a:rPr>
-                        <a:t>3</a:t>
-                      </a:r>
-                    </a:p>
-                  </a:txBody>
-                  <a:tcPr>
-                    <a:lnL w="12700" cap="flat" cmpd="sng" algn="ctr">
-                      <a:solidFill>
-                        <a:schemeClr val="tx1"/>
-                      </a:solidFill>
-                      <a:prstDash val="solid"/>
-                      <a:round/>
-                      <a:headEnd type="none" w="med" len="med"/>
-                      <a:tailEnd type="none" w="med" len="med"/>
-                    </a:lnL>
-                    <a:lnR w="12700" cap="flat" cmpd="sng" algn="ctr">
-                      <a:solidFill>
-                        <a:schemeClr val="tx1"/>
-                      </a:solidFill>
-                      <a:prstDash val="solid"/>
-                      <a:round/>
-                      <a:headEnd type="none" w="med" len="med"/>
-                      <a:tailEnd type="none" w="med" len="med"/>
-                    </a:lnR>
-                    <a:lnT w="12700" cap="flat" cmpd="sng" algn="ctr">
-                      <a:solidFill>
-                        <a:schemeClr val="tx1"/>
-                      </a:solidFill>
-                      <a:prstDash val="solid"/>
-                      <a:round/>
-                      <a:headEnd type="none" w="med" len="med"/>
-                      <a:tailEnd type="none" w="med" len="med"/>
-                    </a:lnT>
-                    <a:lnB w="12700" cap="flat" cmpd="sng" algn="ctr">
-                      <a:solidFill>
-                        <a:schemeClr val="tx1"/>
-                      </a:solidFill>
-                      <a:prstDash val="solid"/>
-                      <a:round/>
-                      <a:headEnd type="none" w="med" len="med"/>
-                      <a:tailEnd type="none" w="med" len="med"/>
-                    </a:lnB>
-                    <a:lnTlToBr w="12700" cmpd="sng">
-                      <a:noFill/>
-                      <a:prstDash val="solid"/>
-                    </a:lnTlToBr>
-                    <a:lnBlToTr w="12700" cmpd="sng">
-                      <a:noFill/>
-                      <a:prstDash val="solid"/>
-                    </a:lnBlToTr>
-                    <a:solidFill>
-                      <a:schemeClr val="bg1"/>
-                    </a:solidFill>
-                  </a:tcPr>
-                </a:tc>
-                <a:tc>
-                  <a:txBody>
-                    <a:bodyPr/>
-                    <a:lstStyle/>
-                    <a:p>
-                      <a:r>
-                        <a:rPr lang="en-AU" b="0" dirty="0">
-                          <a:solidFill>
-                            <a:schemeClr val="tx1"/>
-                          </a:solidFill>
-                        </a:rPr>
-                        <a:t>Enter</a:t>
-                      </a:r>
-                    </a:p>
-                  </a:txBody>
-                  <a:tcPr>
-                    <a:lnL w="12700" cap="flat" cmpd="sng" algn="ctr">
-                      <a:solidFill>
-                        <a:schemeClr val="tx1"/>
-                      </a:solidFill>
-                      <a:prstDash val="solid"/>
-                      <a:round/>
-                      <a:headEnd type="none" w="med" len="med"/>
-                      <a:tailEnd type="none" w="med" len="med"/>
-                    </a:lnL>
-                    <a:lnR w="12700" cap="flat" cmpd="sng" algn="ctr">
-                      <a:solidFill>
-                        <a:schemeClr val="tx1"/>
-                      </a:solidFill>
-                      <a:prstDash val="solid"/>
-                      <a:round/>
-                      <a:headEnd type="none" w="med" len="med"/>
-                      <a:tailEnd type="none" w="med" len="med"/>
-                    </a:lnR>
-                    <a:lnT w="12700" cap="flat" cmpd="sng" algn="ctr">
-                      <a:solidFill>
-                        <a:schemeClr val="tx1"/>
-                      </a:solidFill>
-                      <a:prstDash val="solid"/>
-                      <a:round/>
-                      <a:headEnd type="none" w="med" len="med"/>
-                      <a:tailEnd type="none" w="med" len="med"/>
-                    </a:lnT>
-                    <a:lnB w="12700" cap="flat" cmpd="sng" algn="ctr">
-                      <a:solidFill>
-                        <a:schemeClr val="tx1"/>
-                      </a:solidFill>
-                      <a:prstDash val="solid"/>
-                      <a:round/>
-                      <a:headEnd type="none" w="med" len="med"/>
-                      <a:tailEnd type="none" w="med" len="med"/>
-                    </a:lnB>
-                    <a:lnTlToBr w="12700" cmpd="sng">
-                      <a:noFill/>
-                      <a:prstDash val="solid"/>
-                    </a:lnTlToBr>
-                    <a:lnBlToTr w="12700" cmpd="sng">
-                      <a:noFill/>
-                      <a:prstDash val="solid"/>
-                    </a:lnBlToTr>
-                    <a:solidFill>
-                      <a:schemeClr val="bg1"/>
-                    </a:solidFill>
-                  </a:tcPr>
-                </a:tc>
-                <a:extLst>
-                  <a:ext uri="{0D108BD9-81ED-4DB2-BD59-A6C34878D82A}">
-                    <a16:rowId xmlns:a16="http://schemas.microsoft.com/office/drawing/2014/main" val="581918872"/>
+                    <a16:rowId xmlns:a16="http://schemas.microsoft.com/office/drawing/2014/main" val="277636715"/>
                   </a:ext>
                 </a:extLst>
               </a:tr>
@@ -11016,7 +10443,7 @@
         <p:spPr>
           <a:xfrm>
             <a:off x="6096000" y="1991263"/>
-            <a:ext cx="3501224" cy="646331"/>
+            <a:ext cx="3501224" cy="369332"/>
           </a:xfrm>
           <a:prstGeom prst="rect">
             <a:avLst/>
@@ -11031,7 +10458,7 @@
           <a:p>
             <a:r>
               <a:rPr lang="en-AU" dirty="0"/>
-              <a:t>All collisions will be a tile sized box around the object</a:t>
+              <a:t>TODO</a:t>
             </a:r>
           </a:p>
         </p:txBody>
@@ -11040,850 +10467,6 @@
     <p:extLst>
       <p:ext uri="{BB962C8B-B14F-4D97-AF65-F5344CB8AC3E}">
         <p14:creationId xmlns:p14="http://schemas.microsoft.com/office/powerpoint/2010/main" val="2240765577"/>
-      </p:ext>
-    </p:extLst>
-  </p:cSld>
-  <p:clrMapOvr>
-    <a:masterClrMapping/>
-  </p:clrMapOvr>
-</p:sld>
-</file>
-
-<file path=ppt/slides/slide8.xml><?xml version="1.0" encoding="utf-8"?>
-<p:sld xmlns:a="http://schemas.openxmlformats.org/drawingml/2006/main" xmlns:r="http://schemas.openxmlformats.org/officeDocument/2006/relationships" xmlns:p="http://schemas.openxmlformats.org/presentationml/2006/main">
-  <p:cSld>
-    <p:spTree>
-      <p:nvGrpSpPr>
-        <p:cNvPr id="1" name=""/>
-        <p:cNvGrpSpPr/>
-        <p:nvPr/>
-      </p:nvGrpSpPr>
-      <p:grpSpPr>
-        <a:xfrm>
-          <a:off x="0" y="0"/>
-          <a:ext cx="0" cy="0"/>
-          <a:chOff x="0" y="0"/>
-          <a:chExt cx="0" cy="0"/>
-        </a:xfrm>
-      </p:grpSpPr>
-      <p:sp>
-        <p:nvSpPr>
-          <p:cNvPr id="2" name="Title 1">
-            <a:extLst>
-              <a:ext uri="{FF2B5EF4-FFF2-40B4-BE49-F238E27FC236}">
-                <a16:creationId xmlns:a16="http://schemas.microsoft.com/office/drawing/2014/main" id="{84F877D3-839B-4465-B541-095409D6AD96}"/>
-              </a:ext>
-            </a:extLst>
-          </p:cNvPr>
-          <p:cNvSpPr>
-            <a:spLocks noGrp="1"/>
-          </p:cNvSpPr>
-          <p:nvPr>
-            <p:ph type="ctrTitle"/>
-          </p:nvPr>
-        </p:nvSpPr>
-        <p:spPr>
-          <a:xfrm>
-            <a:off x="482599" y="-540292"/>
-            <a:ext cx="10506991" cy="2531555"/>
-          </a:xfrm>
-        </p:spPr>
-        <p:txBody>
-          <a:bodyPr/>
-          <a:lstStyle/>
-          <a:p>
-            <a:r>
-              <a:rPr lang="en-AU" dirty="0"/>
-              <a:t>Game States</a:t>
-            </a:r>
-          </a:p>
-        </p:txBody>
-      </p:sp>
-      <p:sp>
-        <p:nvSpPr>
-          <p:cNvPr id="3" name="Subtitle 2">
-            <a:extLst>
-              <a:ext uri="{FF2B5EF4-FFF2-40B4-BE49-F238E27FC236}">
-                <a16:creationId xmlns:a16="http://schemas.microsoft.com/office/drawing/2014/main" id="{2BC5A390-3123-4129-9AD0-B6F121063F06}"/>
-              </a:ext>
-            </a:extLst>
-          </p:cNvPr>
-          <p:cNvSpPr>
-            <a:spLocks noGrp="1"/>
-          </p:cNvSpPr>
-          <p:nvPr>
-            <p:ph type="subTitle" idx="1"/>
-          </p:nvPr>
-        </p:nvSpPr>
-        <p:spPr>
-          <a:xfrm>
-            <a:off x="482600" y="2234316"/>
-            <a:ext cx="10506991" cy="3645275"/>
-          </a:xfrm>
-        </p:spPr>
-        <p:txBody>
-          <a:bodyPr/>
-          <a:lstStyle/>
-          <a:p>
-            <a:r>
-              <a:rPr lang="en-AU" dirty="0"/>
-              <a:t>Menu</a:t>
-            </a:r>
-          </a:p>
-          <a:p>
-            <a:r>
-              <a:rPr lang="en-AU" dirty="0"/>
-              <a:t>Play</a:t>
-            </a:r>
-          </a:p>
-          <a:p>
-            <a:r>
-              <a:rPr lang="en-AU" dirty="0"/>
-              <a:t>Pause</a:t>
-            </a:r>
-          </a:p>
-          <a:p>
-            <a:r>
-              <a:rPr lang="en-AU" dirty="0"/>
-              <a:t>Game Over</a:t>
-            </a:r>
-          </a:p>
-          <a:p>
-            <a:r>
-              <a:rPr lang="en-AU" dirty="0"/>
-              <a:t>Credits</a:t>
-            </a:r>
-          </a:p>
-          <a:p>
-            <a:endParaRPr lang="en-AU" dirty="0"/>
-          </a:p>
-        </p:txBody>
-      </p:sp>
-      <p:sp>
-        <p:nvSpPr>
-          <p:cNvPr id="4" name="Rectangle: Rounded Corners 3">
-            <a:extLst>
-              <a:ext uri="{FF2B5EF4-FFF2-40B4-BE49-F238E27FC236}">
-                <a16:creationId xmlns:a16="http://schemas.microsoft.com/office/drawing/2014/main" id="{3171AB5F-13A3-475F-9230-38FC73AD6C45}"/>
-              </a:ext>
-            </a:extLst>
-          </p:cNvPr>
-          <p:cNvSpPr/>
-          <p:nvPr/>
-        </p:nvSpPr>
-        <p:spPr>
-          <a:xfrm>
-            <a:off x="6114996" y="2418249"/>
-            <a:ext cx="1924216" cy="942768"/>
-          </a:xfrm>
-          <a:prstGeom prst="roundRect">
-            <a:avLst/>
-          </a:prstGeom>
-          <a:ln/>
-        </p:spPr>
-        <p:style>
-          <a:lnRef idx="2">
-            <a:schemeClr val="dk1"/>
-          </a:lnRef>
-          <a:fillRef idx="1">
-            <a:schemeClr val="lt1"/>
-          </a:fillRef>
-          <a:effectRef idx="0">
-            <a:schemeClr val="dk1"/>
-          </a:effectRef>
-          <a:fontRef idx="minor">
-            <a:schemeClr val="dk1"/>
-          </a:fontRef>
-        </p:style>
-        <p:txBody>
-          <a:bodyPr rtlCol="0" anchor="ctr"/>
-          <a:lstStyle/>
-          <a:p>
-            <a:pPr algn="ctr"/>
-            <a:r>
-              <a:rPr lang="en-US" altLang="ja-JP" dirty="0"/>
-              <a:t>Menu</a:t>
-            </a:r>
-            <a:endParaRPr lang="en-AU" dirty="0"/>
-          </a:p>
-        </p:txBody>
-      </p:sp>
-      <p:sp>
-        <p:nvSpPr>
-          <p:cNvPr id="5" name="Rectangle: Rounded Corners 4">
-            <a:extLst>
-              <a:ext uri="{FF2B5EF4-FFF2-40B4-BE49-F238E27FC236}">
-                <a16:creationId xmlns:a16="http://schemas.microsoft.com/office/drawing/2014/main" id="{2334A423-1B42-4923-9BF1-7BF94B58A594}"/>
-              </a:ext>
-            </a:extLst>
-          </p:cNvPr>
-          <p:cNvSpPr/>
-          <p:nvPr/>
-        </p:nvSpPr>
-        <p:spPr>
-          <a:xfrm>
-            <a:off x="2947286" y="2418249"/>
-            <a:ext cx="1804945" cy="949022"/>
-          </a:xfrm>
-          <a:prstGeom prst="roundRect">
-            <a:avLst/>
-          </a:prstGeom>
-        </p:spPr>
-        <p:style>
-          <a:lnRef idx="2">
-            <a:schemeClr val="dk1"/>
-          </a:lnRef>
-          <a:fillRef idx="1">
-            <a:schemeClr val="lt1"/>
-          </a:fillRef>
-          <a:effectRef idx="0">
-            <a:schemeClr val="dk1"/>
-          </a:effectRef>
-          <a:fontRef idx="minor">
-            <a:schemeClr val="dk1"/>
-          </a:fontRef>
-        </p:style>
-        <p:txBody>
-          <a:bodyPr rtlCol="0" anchor="ctr"/>
-          <a:lstStyle/>
-          <a:p>
-            <a:pPr algn="ctr"/>
-            <a:r>
-              <a:rPr lang="en-AU" dirty="0"/>
-              <a:t>Pause</a:t>
-            </a:r>
-          </a:p>
-        </p:txBody>
-      </p:sp>
-      <p:sp>
-        <p:nvSpPr>
-          <p:cNvPr id="6" name="Rectangle: Rounded Corners 5">
-            <a:extLst>
-              <a:ext uri="{FF2B5EF4-FFF2-40B4-BE49-F238E27FC236}">
-                <a16:creationId xmlns:a16="http://schemas.microsoft.com/office/drawing/2014/main" id="{025B5F3F-5924-4DAE-96C5-941348389B7E}"/>
-              </a:ext>
-            </a:extLst>
-          </p:cNvPr>
-          <p:cNvSpPr/>
-          <p:nvPr/>
-        </p:nvSpPr>
-        <p:spPr>
-          <a:xfrm>
-            <a:off x="8909000" y="2418249"/>
-            <a:ext cx="2080590" cy="1017767"/>
-          </a:xfrm>
-          <a:prstGeom prst="roundRect">
-            <a:avLst/>
-          </a:prstGeom>
-        </p:spPr>
-        <p:style>
-          <a:lnRef idx="2">
-            <a:schemeClr val="dk1"/>
-          </a:lnRef>
-          <a:fillRef idx="1">
-            <a:schemeClr val="lt1"/>
-          </a:fillRef>
-          <a:effectRef idx="0">
-            <a:schemeClr val="dk1"/>
-          </a:effectRef>
-          <a:fontRef idx="minor">
-            <a:schemeClr val="dk1"/>
-          </a:fontRef>
-        </p:style>
-        <p:txBody>
-          <a:bodyPr rtlCol="0" anchor="ctr"/>
-          <a:lstStyle/>
-          <a:p>
-            <a:pPr algn="ctr"/>
-            <a:r>
-              <a:rPr lang="en-AU" dirty="0"/>
-              <a:t>Credits</a:t>
-            </a:r>
-          </a:p>
-        </p:txBody>
-      </p:sp>
-      <p:sp>
-        <p:nvSpPr>
-          <p:cNvPr id="7" name="Rectangle: Rounded Corners 6">
-            <a:extLst>
-              <a:ext uri="{FF2B5EF4-FFF2-40B4-BE49-F238E27FC236}">
-                <a16:creationId xmlns:a16="http://schemas.microsoft.com/office/drawing/2014/main" id="{805457A3-AC54-4BB7-A061-D90B9133153D}"/>
-              </a:ext>
-            </a:extLst>
-          </p:cNvPr>
-          <p:cNvSpPr/>
-          <p:nvPr/>
-        </p:nvSpPr>
-        <p:spPr>
-          <a:xfrm>
-            <a:off x="4816503" y="4357495"/>
-            <a:ext cx="2003729" cy="1017767"/>
-          </a:xfrm>
-          <a:prstGeom prst="roundRect">
-            <a:avLst/>
-          </a:prstGeom>
-        </p:spPr>
-        <p:style>
-          <a:lnRef idx="2">
-            <a:schemeClr val="dk1"/>
-          </a:lnRef>
-          <a:fillRef idx="1">
-            <a:schemeClr val="lt1"/>
-          </a:fillRef>
-          <a:effectRef idx="0">
-            <a:schemeClr val="dk1"/>
-          </a:effectRef>
-          <a:fontRef idx="minor">
-            <a:schemeClr val="dk1"/>
-          </a:fontRef>
-        </p:style>
-        <p:txBody>
-          <a:bodyPr rtlCol="0" anchor="ctr"/>
-          <a:lstStyle/>
-          <a:p>
-            <a:pPr algn="ctr"/>
-            <a:r>
-              <a:rPr lang="en-AU" dirty="0"/>
-              <a:t>Play</a:t>
-            </a:r>
-          </a:p>
-        </p:txBody>
-      </p:sp>
-      <p:sp>
-        <p:nvSpPr>
-          <p:cNvPr id="8" name="Rectangle: Rounded Corners 7">
-            <a:extLst>
-              <a:ext uri="{FF2B5EF4-FFF2-40B4-BE49-F238E27FC236}">
-                <a16:creationId xmlns:a16="http://schemas.microsoft.com/office/drawing/2014/main" id="{01ABD98B-8A36-46AE-8287-B0A4AB96FD37}"/>
-              </a:ext>
-            </a:extLst>
-          </p:cNvPr>
-          <p:cNvSpPr/>
-          <p:nvPr/>
-        </p:nvSpPr>
-        <p:spPr>
-          <a:xfrm>
-            <a:off x="8807733" y="4357494"/>
-            <a:ext cx="2080590" cy="1017767"/>
-          </a:xfrm>
-          <a:prstGeom prst="roundRect">
-            <a:avLst/>
-          </a:prstGeom>
-        </p:spPr>
-        <p:style>
-          <a:lnRef idx="2">
-            <a:schemeClr val="dk1"/>
-          </a:lnRef>
-          <a:fillRef idx="1">
-            <a:schemeClr val="lt1"/>
-          </a:fillRef>
-          <a:effectRef idx="0">
-            <a:schemeClr val="dk1"/>
-          </a:effectRef>
-          <a:fontRef idx="minor">
-            <a:schemeClr val="dk1"/>
-          </a:fontRef>
-        </p:style>
-        <p:txBody>
-          <a:bodyPr rtlCol="0" anchor="ctr"/>
-          <a:lstStyle/>
-          <a:p>
-            <a:pPr algn="ctr"/>
-            <a:r>
-              <a:rPr lang="en-AU" dirty="0"/>
-              <a:t>Game Over</a:t>
-            </a:r>
-          </a:p>
-        </p:txBody>
-      </p:sp>
-      <p:cxnSp>
-        <p:nvCxnSpPr>
-          <p:cNvPr id="12" name="Connector: Elbow 11">
-            <a:extLst>
-              <a:ext uri="{FF2B5EF4-FFF2-40B4-BE49-F238E27FC236}">
-                <a16:creationId xmlns:a16="http://schemas.microsoft.com/office/drawing/2014/main" id="{E7DE61E9-BB15-4F18-BC7E-70A8934CBD4A}"/>
-              </a:ext>
-            </a:extLst>
-          </p:cNvPr>
-          <p:cNvCxnSpPr>
-            <a:cxnSpLocks/>
-            <a:endCxn id="7" idx="0"/>
-          </p:cNvCxnSpPr>
-          <p:nvPr/>
-        </p:nvCxnSpPr>
-        <p:spPr>
-          <a:xfrm rot="5400000">
-            <a:off x="5664890" y="3511369"/>
-            <a:ext cx="999605" cy="692647"/>
-          </a:xfrm>
-          <a:prstGeom prst="bentConnector3">
-            <a:avLst/>
-          </a:prstGeom>
-          <a:ln>
-            <a:tailEnd type="triangle"/>
-          </a:ln>
-        </p:spPr>
-        <p:style>
-          <a:lnRef idx="1">
-            <a:schemeClr val="dk1"/>
-          </a:lnRef>
-          <a:fillRef idx="0">
-            <a:schemeClr val="dk1"/>
-          </a:fillRef>
-          <a:effectRef idx="0">
-            <a:schemeClr val="dk1"/>
-          </a:effectRef>
-          <a:fontRef idx="minor">
-            <a:schemeClr val="tx1"/>
-          </a:fontRef>
-        </p:style>
-      </p:cxnSp>
-      <p:cxnSp>
-        <p:nvCxnSpPr>
-          <p:cNvPr id="15" name="Connector: Elbow 14">
-            <a:extLst>
-              <a:ext uri="{FF2B5EF4-FFF2-40B4-BE49-F238E27FC236}">
-                <a16:creationId xmlns:a16="http://schemas.microsoft.com/office/drawing/2014/main" id="{BF61CA76-713A-4656-B2D0-8361815B7E01}"/>
-              </a:ext>
-            </a:extLst>
-          </p:cNvPr>
-          <p:cNvCxnSpPr>
-            <a:cxnSpLocks/>
-            <a:stCxn id="7" idx="3"/>
-            <a:endCxn id="8" idx="1"/>
-          </p:cNvCxnSpPr>
-          <p:nvPr/>
-        </p:nvCxnSpPr>
-        <p:spPr>
-          <a:xfrm flipV="1">
-            <a:off x="6820232" y="4866378"/>
-            <a:ext cx="1987501" cy="1"/>
-          </a:xfrm>
-          <a:prstGeom prst="bentConnector3">
-            <a:avLst/>
-          </a:prstGeom>
-          <a:ln>
-            <a:tailEnd type="triangle"/>
-          </a:ln>
-        </p:spPr>
-        <p:style>
-          <a:lnRef idx="1">
-            <a:schemeClr val="dk1"/>
-          </a:lnRef>
-          <a:fillRef idx="0">
-            <a:schemeClr val="dk1"/>
-          </a:fillRef>
-          <a:effectRef idx="0">
-            <a:schemeClr val="dk1"/>
-          </a:effectRef>
-          <a:fontRef idx="minor">
-            <a:schemeClr val="tx1"/>
-          </a:fontRef>
-        </p:style>
-      </p:cxnSp>
-      <p:cxnSp>
-        <p:nvCxnSpPr>
-          <p:cNvPr id="17" name="Connector: Elbow 16">
-            <a:extLst>
-              <a:ext uri="{FF2B5EF4-FFF2-40B4-BE49-F238E27FC236}">
-                <a16:creationId xmlns:a16="http://schemas.microsoft.com/office/drawing/2014/main" id="{7D141833-4EFB-4A7A-B52F-6CC6902D46DE}"/>
-              </a:ext>
-            </a:extLst>
-          </p:cNvPr>
-          <p:cNvCxnSpPr>
-            <a:cxnSpLocks/>
-            <a:stCxn id="7" idx="1"/>
-            <a:endCxn id="5" idx="2"/>
-          </p:cNvCxnSpPr>
-          <p:nvPr/>
-        </p:nvCxnSpPr>
-        <p:spPr>
-          <a:xfrm rot="10800000">
-            <a:off x="3849759" y="3367271"/>
-            <a:ext cx="966744" cy="1499108"/>
-          </a:xfrm>
-          <a:prstGeom prst="bentConnector2">
-            <a:avLst/>
-          </a:prstGeom>
-          <a:ln>
-            <a:headEnd type="triangle"/>
-            <a:tailEnd type="triangle"/>
-          </a:ln>
-        </p:spPr>
-        <p:style>
-          <a:lnRef idx="1">
-            <a:schemeClr val="dk1"/>
-          </a:lnRef>
-          <a:fillRef idx="0">
-            <a:schemeClr val="dk1"/>
-          </a:fillRef>
-          <a:effectRef idx="0">
-            <a:schemeClr val="dk1"/>
-          </a:effectRef>
-          <a:fontRef idx="minor">
-            <a:schemeClr val="tx1"/>
-          </a:fontRef>
-        </p:style>
-      </p:cxnSp>
-      <p:cxnSp>
-        <p:nvCxnSpPr>
-          <p:cNvPr id="20" name="Connector: Elbow 19">
-            <a:extLst>
-              <a:ext uri="{FF2B5EF4-FFF2-40B4-BE49-F238E27FC236}">
-                <a16:creationId xmlns:a16="http://schemas.microsoft.com/office/drawing/2014/main" id="{0020035C-F093-4CA0-9E85-DB936AE53644}"/>
-              </a:ext>
-            </a:extLst>
-          </p:cNvPr>
-          <p:cNvCxnSpPr>
-            <a:stCxn id="5" idx="3"/>
-            <a:endCxn id="4" idx="1"/>
-          </p:cNvCxnSpPr>
-          <p:nvPr/>
-        </p:nvCxnSpPr>
-        <p:spPr>
-          <a:xfrm flipV="1">
-            <a:off x="4752231" y="2889633"/>
-            <a:ext cx="1362765" cy="3127"/>
-          </a:xfrm>
-          <a:prstGeom prst="bentConnector3">
-            <a:avLst/>
-          </a:prstGeom>
-          <a:ln>
-            <a:tailEnd type="triangle"/>
-          </a:ln>
-        </p:spPr>
-        <p:style>
-          <a:lnRef idx="1">
-            <a:schemeClr val="dk1"/>
-          </a:lnRef>
-          <a:fillRef idx="0">
-            <a:schemeClr val="dk1"/>
-          </a:fillRef>
-          <a:effectRef idx="0">
-            <a:schemeClr val="dk1"/>
-          </a:effectRef>
-          <a:fontRef idx="minor">
-            <a:schemeClr val="tx1"/>
-          </a:fontRef>
-        </p:style>
-      </p:cxnSp>
-      <p:cxnSp>
-        <p:nvCxnSpPr>
-          <p:cNvPr id="22" name="Connector: Elbow 21">
-            <a:extLst>
-              <a:ext uri="{FF2B5EF4-FFF2-40B4-BE49-F238E27FC236}">
-                <a16:creationId xmlns:a16="http://schemas.microsoft.com/office/drawing/2014/main" id="{45D4D979-1A34-451B-8DBB-BEDEC0A75E8F}"/>
-              </a:ext>
-            </a:extLst>
-          </p:cNvPr>
-          <p:cNvCxnSpPr>
-            <a:stCxn id="4" idx="3"/>
-            <a:endCxn id="6" idx="1"/>
-          </p:cNvCxnSpPr>
-          <p:nvPr/>
-        </p:nvCxnSpPr>
-        <p:spPr>
-          <a:xfrm>
-            <a:off x="8039212" y="2889633"/>
-            <a:ext cx="869788" cy="37500"/>
-          </a:xfrm>
-          <a:prstGeom prst="bentConnector3">
-            <a:avLst/>
-          </a:prstGeom>
-          <a:ln>
-            <a:headEnd type="triangle"/>
-            <a:tailEnd type="triangle"/>
-          </a:ln>
-        </p:spPr>
-        <p:style>
-          <a:lnRef idx="1">
-            <a:schemeClr val="dk1"/>
-          </a:lnRef>
-          <a:fillRef idx="0">
-            <a:schemeClr val="dk1"/>
-          </a:fillRef>
-          <a:effectRef idx="0">
-            <a:schemeClr val="dk1"/>
-          </a:effectRef>
-          <a:fontRef idx="minor">
-            <a:schemeClr val="tx1"/>
-          </a:fontRef>
-        </p:style>
-      </p:cxnSp>
-      <p:cxnSp>
-        <p:nvCxnSpPr>
-          <p:cNvPr id="24" name="Connector: Elbow 23">
-            <a:extLst>
-              <a:ext uri="{FF2B5EF4-FFF2-40B4-BE49-F238E27FC236}">
-                <a16:creationId xmlns:a16="http://schemas.microsoft.com/office/drawing/2014/main" id="{89CCB445-CEE4-4557-A280-BC22A6D86CCC}"/>
-              </a:ext>
-            </a:extLst>
-          </p:cNvPr>
-          <p:cNvCxnSpPr>
-            <a:cxnSpLocks/>
-            <a:stCxn id="8" idx="0"/>
-            <a:endCxn id="4" idx="2"/>
-          </p:cNvCxnSpPr>
-          <p:nvPr/>
-        </p:nvCxnSpPr>
-        <p:spPr>
-          <a:xfrm rot="16200000" flipV="1">
-            <a:off x="7964328" y="2473794"/>
-            <a:ext cx="996477" cy="2770924"/>
-          </a:xfrm>
-          <a:prstGeom prst="bentConnector3">
-            <a:avLst>
-              <a:gd name="adj1" fmla="val 50000"/>
-            </a:avLst>
-          </a:prstGeom>
-          <a:ln>
-            <a:tailEnd type="triangle"/>
-          </a:ln>
-        </p:spPr>
-        <p:style>
-          <a:lnRef idx="1">
-            <a:schemeClr val="dk1"/>
-          </a:lnRef>
-          <a:fillRef idx="0">
-            <a:schemeClr val="dk1"/>
-          </a:fillRef>
-          <a:effectRef idx="0">
-            <a:schemeClr val="dk1"/>
-          </a:effectRef>
-          <a:fontRef idx="minor">
-            <a:schemeClr val="tx1"/>
-          </a:fontRef>
-        </p:style>
-      </p:cxnSp>
-      <p:sp>
-        <p:nvSpPr>
-          <p:cNvPr id="49" name="TextBox 48">
-            <a:extLst>
-              <a:ext uri="{FF2B5EF4-FFF2-40B4-BE49-F238E27FC236}">
-                <a16:creationId xmlns:a16="http://schemas.microsoft.com/office/drawing/2014/main" id="{EC70072D-8FF6-4763-94B3-6CA55B160787}"/>
-              </a:ext>
-            </a:extLst>
-          </p:cNvPr>
-          <p:cNvSpPr txBox="1"/>
-          <p:nvPr/>
-        </p:nvSpPr>
-        <p:spPr>
-          <a:xfrm>
-            <a:off x="4890053" y="2418249"/>
-            <a:ext cx="1057524" cy="369332"/>
-          </a:xfrm>
-          <a:prstGeom prst="rect">
-            <a:avLst/>
-          </a:prstGeom>
-          <a:noFill/>
-        </p:spPr>
-        <p:txBody>
-          <a:bodyPr wrap="square" rtlCol="0">
-            <a:spAutoFit/>
-          </a:bodyPr>
-          <a:lstStyle/>
-          <a:p>
-            <a:r>
-              <a:rPr lang="en-AU" dirty="0"/>
-              <a:t>On Exit</a:t>
-            </a:r>
-          </a:p>
-        </p:txBody>
-      </p:sp>
-      <p:sp>
-        <p:nvSpPr>
-          <p:cNvPr id="52" name="TextBox 51">
-            <a:extLst>
-              <a:ext uri="{FF2B5EF4-FFF2-40B4-BE49-F238E27FC236}">
-                <a16:creationId xmlns:a16="http://schemas.microsoft.com/office/drawing/2014/main" id="{F9982033-CE3B-4198-879B-8779F6A20A4C}"/>
-              </a:ext>
-            </a:extLst>
-          </p:cNvPr>
-          <p:cNvSpPr txBox="1"/>
-          <p:nvPr/>
-        </p:nvSpPr>
-        <p:spPr>
-          <a:xfrm>
-            <a:off x="3070028" y="3610324"/>
-            <a:ext cx="738664" cy="1256055"/>
-          </a:xfrm>
-          <a:prstGeom prst="rect">
-            <a:avLst/>
-          </a:prstGeom>
-          <a:noFill/>
-        </p:spPr>
-        <p:txBody>
-          <a:bodyPr vert="eaVert" wrap="square" rtlCol="0">
-            <a:spAutoFit/>
-          </a:bodyPr>
-          <a:lstStyle/>
-          <a:p>
-            <a:r>
-              <a:rPr lang="en-AU" dirty="0"/>
-              <a:t>On Esc Key Press</a:t>
-            </a:r>
-          </a:p>
-        </p:txBody>
-      </p:sp>
-      <p:sp>
-        <p:nvSpPr>
-          <p:cNvPr id="56" name="TextBox 55">
-            <a:extLst>
-              <a:ext uri="{FF2B5EF4-FFF2-40B4-BE49-F238E27FC236}">
-                <a16:creationId xmlns:a16="http://schemas.microsoft.com/office/drawing/2014/main" id="{3F5BFBC5-4825-4DE3-9B5C-93B3CB0FB8E9}"/>
-              </a:ext>
-            </a:extLst>
-          </p:cNvPr>
-          <p:cNvSpPr txBox="1"/>
-          <p:nvPr/>
-        </p:nvSpPr>
-        <p:spPr>
-          <a:xfrm>
-            <a:off x="6997147" y="4961614"/>
-            <a:ext cx="1749287" cy="646331"/>
-          </a:xfrm>
-          <a:prstGeom prst="rect">
-            <a:avLst/>
-          </a:prstGeom>
-          <a:noFill/>
-        </p:spPr>
-        <p:txBody>
-          <a:bodyPr wrap="square" rtlCol="0">
-            <a:spAutoFit/>
-          </a:bodyPr>
-          <a:lstStyle/>
-          <a:p>
-            <a:r>
-              <a:rPr lang="en-AU" dirty="0"/>
-              <a:t>On All Entities Dead</a:t>
-            </a:r>
-          </a:p>
-        </p:txBody>
-      </p:sp>
-    </p:spTree>
-    <p:extLst>
-      <p:ext uri="{BB962C8B-B14F-4D97-AF65-F5344CB8AC3E}">
-        <p14:creationId xmlns:p14="http://schemas.microsoft.com/office/powerpoint/2010/main" val="2851200994"/>
-      </p:ext>
-    </p:extLst>
-  </p:cSld>
-  <p:clrMapOvr>
-    <a:masterClrMapping/>
-  </p:clrMapOvr>
-</p:sld>
-</file>
-
-<file path=ppt/slides/slide9.xml><?xml version="1.0" encoding="utf-8"?>
-<p:sld xmlns:a="http://schemas.openxmlformats.org/drawingml/2006/main" xmlns:r="http://schemas.openxmlformats.org/officeDocument/2006/relationships" xmlns:p="http://schemas.openxmlformats.org/presentationml/2006/main">
-  <p:cSld>
-    <p:spTree>
-      <p:nvGrpSpPr>
-        <p:cNvPr id="1" name=""/>
-        <p:cNvGrpSpPr/>
-        <p:nvPr/>
-      </p:nvGrpSpPr>
-      <p:grpSpPr>
-        <a:xfrm>
-          <a:off x="0" y="0"/>
-          <a:ext cx="0" cy="0"/>
-          <a:chOff x="0" y="0"/>
-          <a:chExt cx="0" cy="0"/>
-        </a:xfrm>
-      </p:grpSpPr>
-      <p:sp>
-        <p:nvSpPr>
-          <p:cNvPr id="2" name="Title 1">
-            <a:extLst>
-              <a:ext uri="{FF2B5EF4-FFF2-40B4-BE49-F238E27FC236}">
-                <a16:creationId xmlns:a16="http://schemas.microsoft.com/office/drawing/2014/main" id="{84F877D3-839B-4465-B541-095409D6AD96}"/>
-              </a:ext>
-            </a:extLst>
-          </p:cNvPr>
-          <p:cNvSpPr>
-            <a:spLocks noGrp="1"/>
-          </p:cNvSpPr>
-          <p:nvPr>
-            <p:ph type="ctrTitle"/>
-          </p:nvPr>
-        </p:nvSpPr>
-        <p:spPr>
-          <a:xfrm>
-            <a:off x="482599" y="-540292"/>
-            <a:ext cx="10506991" cy="2531555"/>
-          </a:xfrm>
-        </p:spPr>
-        <p:txBody>
-          <a:bodyPr/>
-          <a:lstStyle/>
-          <a:p>
-            <a:r>
-              <a:rPr lang="en-AU" dirty="0"/>
-              <a:t>Game States</a:t>
-            </a:r>
-          </a:p>
-        </p:txBody>
-      </p:sp>
-      <p:sp>
-        <p:nvSpPr>
-          <p:cNvPr id="3" name="Subtitle 2">
-            <a:extLst>
-              <a:ext uri="{FF2B5EF4-FFF2-40B4-BE49-F238E27FC236}">
-                <a16:creationId xmlns:a16="http://schemas.microsoft.com/office/drawing/2014/main" id="{2BC5A390-3123-4129-9AD0-B6F121063F06}"/>
-              </a:ext>
-            </a:extLst>
-          </p:cNvPr>
-          <p:cNvSpPr>
-            <a:spLocks noGrp="1"/>
-          </p:cNvSpPr>
-          <p:nvPr>
-            <p:ph type="subTitle" idx="1"/>
-          </p:nvPr>
-        </p:nvSpPr>
-        <p:spPr>
-          <a:xfrm>
-            <a:off x="482600" y="2234316"/>
-            <a:ext cx="10506991" cy="3645275"/>
-          </a:xfrm>
-        </p:spPr>
-        <p:txBody>
-          <a:bodyPr/>
-          <a:lstStyle/>
-          <a:p>
-            <a:r>
-              <a:rPr lang="en-AU" dirty="0"/>
-              <a:t>Background Music:</a:t>
-            </a:r>
-          </a:p>
-          <a:p>
-            <a:r>
-              <a:rPr lang="en-AU" dirty="0"/>
-              <a:t>Music fade in and out when entering and exiting screens.</a:t>
-            </a:r>
-          </a:p>
-          <a:p>
-            <a:r>
-              <a:rPr lang="en-AU" dirty="0"/>
-              <a:t>All music will be soft piano.</a:t>
-            </a:r>
-          </a:p>
-          <a:p>
-            <a:endParaRPr lang="en-AU" dirty="0"/>
-          </a:p>
-          <a:p>
-            <a:r>
-              <a:rPr lang="en-AU" dirty="0"/>
-              <a:t>Forest Sounds.</a:t>
-            </a:r>
-          </a:p>
-          <a:p>
-            <a:endParaRPr lang="en-AU" dirty="0"/>
-          </a:p>
-        </p:txBody>
-      </p:sp>
-    </p:spTree>
-    <p:extLst>
-      <p:ext uri="{BB962C8B-B14F-4D97-AF65-F5344CB8AC3E}">
-        <p14:creationId xmlns:p14="http://schemas.microsoft.com/office/powerpoint/2010/main" val="2006226899"/>
       </p:ext>
     </p:extLst>
   </p:cSld>

</xml_diff>